<commit_message>
Preza za apk update-ana
</commit_message>
<xml_diff>
--- a/projects/paradizot-kcurcija-ekevic-ltomic-jvitaljic/Plan aplikacije.pptx
+++ b/projects/paradizot-kcurcija-ekevic-ltomic-jvitaljic/Plan aplikacije.pptx
@@ -7,6 +7,17 @@
   <p:sldIdLst>
     <p:sldId id="256" r:id="rId2"/>
     <p:sldId id="257" r:id="rId3"/>
+    <p:sldId id="258" r:id="rId4"/>
+    <p:sldId id="259" r:id="rId5"/>
+    <p:sldId id="260" r:id="rId6"/>
+    <p:sldId id="261" r:id="rId7"/>
+    <p:sldId id="262" r:id="rId8"/>
+    <p:sldId id="263" r:id="rId9"/>
+    <p:sldId id="264" r:id="rId10"/>
+    <p:sldId id="265" r:id="rId11"/>
+    <p:sldId id="266" r:id="rId12"/>
+    <p:sldId id="267" r:id="rId13"/>
+    <p:sldId id="268" r:id="rId14"/>
   </p:sldIdLst>
   <p:sldSz cx="12192000" cy="6858000"/>
   <p:notesSz cx="6858000" cy="9144000"/>
@@ -105,6 +116,11 @@
       </a:defRPr>
     </a:lvl9pPr>
   </p:defaultTextStyle>
+  <p:extLst>
+    <p:ext uri="{EFAFB233-063F-42B5-8137-9DF3F51BA10A}">
+      <p15:sldGuideLst xmlns:p15="http://schemas.microsoft.com/office/powerpoint/2012/main"/>
+    </p:ext>
+  </p:extLst>
 </p:presentation>
 </file>
 
@@ -3629,7 +3645,17 @@
             </a:pPr>
             <a:r>
               <a:rPr lang="hr-HR" sz="1600" dirty="0" smtClean="0"/>
-              <a:t>- Vodi na stranicu „Zvijezda” </a:t>
+              <a:t>- Vodi na stranicu „</a:t>
+            </a:r>
+            <a:r>
+              <a:rPr lang="hr-HR" sz="1600" dirty="0" smtClean="0">
+                <a:hlinkClick r:id="rId3" action="ppaction://hlinksldjump"/>
+              </a:rPr>
+              <a:t>Zvijezda</a:t>
+            </a:r>
+            <a:r>
+              <a:rPr lang="hr-HR" sz="1600" dirty="0" smtClean="0"/>
+              <a:t>” </a:t>
             </a:r>
             <a:r>
               <a:rPr lang="hr-HR" sz="1600" b="1" dirty="0" smtClean="0"/>
@@ -3642,7 +3668,17 @@
             </a:pPr>
             <a:r>
               <a:rPr lang="hr-HR" sz="1600" dirty="0" smtClean="0"/>
-              <a:t>- Vodi na stranicu „Planiraj putovanje”</a:t>
+              <a:t>- Vodi na stranicu „</a:t>
+            </a:r>
+            <a:r>
+              <a:rPr lang="hr-HR" sz="1600" dirty="0" smtClean="0">
+                <a:hlinkClick r:id="rId4" action="ppaction://hlinksldjump"/>
+              </a:rPr>
+              <a:t>Planiraj putovanje</a:t>
+            </a:r>
+            <a:r>
+              <a:rPr lang="hr-HR" sz="1600" dirty="0" smtClean="0"/>
+              <a:t>”</a:t>
             </a:r>
           </a:p>
           <a:p>
@@ -3651,7 +3687,17 @@
             </a:pPr>
             <a:r>
               <a:rPr lang="hr-HR" sz="1600" dirty="0" smtClean="0"/>
-              <a:t>-Vodi na stranicu „Vozni red”</a:t>
+              <a:t>-Vodi na stranicu „</a:t>
+            </a:r>
+            <a:r>
+              <a:rPr lang="hr-HR" sz="1600" dirty="0" smtClean="0">
+                <a:hlinkClick r:id="rId5" action="ppaction://hlinksldjump"/>
+              </a:rPr>
+              <a:t>Vozni red</a:t>
+            </a:r>
+            <a:r>
+              <a:rPr lang="hr-HR" sz="1600" dirty="0" smtClean="0"/>
+              <a:t>”</a:t>
             </a:r>
           </a:p>
           <a:p>
@@ -3660,7 +3706,17 @@
             </a:pPr>
             <a:r>
               <a:rPr lang="hr-HR" sz="1600" dirty="0" smtClean="0"/>
-              <a:t>-Vodi na stranicu „Prodajna mjesta”</a:t>
+              <a:t>-Vodi na stranicu „</a:t>
+            </a:r>
+            <a:r>
+              <a:rPr lang="hr-HR" sz="1600" dirty="0" smtClean="0">
+                <a:hlinkClick r:id="rId6" action="ppaction://hlinksldjump"/>
+              </a:rPr>
+              <a:t>Prodajna mjesta</a:t>
+            </a:r>
+            <a:r>
+              <a:rPr lang="hr-HR" sz="1600" dirty="0" smtClean="0"/>
+              <a:t>”</a:t>
             </a:r>
           </a:p>
           <a:p>
@@ -3669,7 +3725,17 @@
             </a:pPr>
             <a:r>
               <a:rPr lang="hr-HR" sz="1600" dirty="0" smtClean="0"/>
-              <a:t>- Vodi na stranicu „E-novčanik” </a:t>
+              <a:t>- Vodi na stranicu „</a:t>
+            </a:r>
+            <a:r>
+              <a:rPr lang="hr-HR" sz="1600" dirty="0" smtClean="0">
+                <a:hlinkClick r:id="rId7" action="ppaction://hlinksldjump"/>
+              </a:rPr>
+              <a:t>E-novčanik</a:t>
+            </a:r>
+            <a:r>
+              <a:rPr lang="hr-HR" sz="1600" dirty="0" smtClean="0"/>
+              <a:t>” </a:t>
             </a:r>
             <a:r>
               <a:rPr lang="hr-HR" sz="1600" b="1" dirty="0" smtClean="0"/>
@@ -3682,7 +3748,21 @@
             </a:pPr>
             <a:r>
               <a:rPr lang="hr-HR" sz="1600" dirty="0" smtClean="0"/>
-              <a:t>-Vodi na stranicu „Moje karte”</a:t>
+              <a:t>-</a:t>
+            </a:r>
+            <a:r>
+              <a:rPr lang="hr-HR" sz="1600" dirty="0" smtClean="0"/>
+              <a:t>Vodi na stranicu „</a:t>
+            </a:r>
+            <a:r>
+              <a:rPr lang="hr-HR" sz="1600" dirty="0" smtClean="0">
+                <a:hlinkClick r:id="rId8" action="ppaction://hlinksldjump"/>
+              </a:rPr>
+              <a:t>Moje karte</a:t>
+            </a:r>
+            <a:r>
+              <a:rPr lang="hr-HR" sz="1600" dirty="0" smtClean="0"/>
+              <a:t>”</a:t>
             </a:r>
           </a:p>
           <a:p>
@@ -3691,7 +3771,17 @@
             </a:pPr>
             <a:r>
               <a:rPr lang="hr-HR" sz="1600" dirty="0" smtClean="0"/>
-              <a:t>-Vodi na stranicu „Kupi kartu”</a:t>
+              <a:t>-Vodi na stranicu „</a:t>
+            </a:r>
+            <a:r>
+              <a:rPr lang="hr-HR" sz="1600" dirty="0" smtClean="0">
+                <a:hlinkClick r:id="rId9" action="ppaction://hlinksldjump"/>
+              </a:rPr>
+              <a:t>Kupi kartu</a:t>
+            </a:r>
+            <a:r>
+              <a:rPr lang="hr-HR" sz="1600" dirty="0" smtClean="0"/>
+              <a:t>”</a:t>
             </a:r>
           </a:p>
           <a:p>
@@ -3700,7 +3790,17 @@
             </a:pPr>
             <a:r>
               <a:rPr lang="hr-HR" sz="1600" dirty="0" smtClean="0"/>
-              <a:t>-Vodi na stranicu „Aktivacija profila”</a:t>
+              <a:t>-Vodi na stranicu „</a:t>
+            </a:r>
+            <a:r>
+              <a:rPr lang="hr-HR" sz="1600" dirty="0" smtClean="0">
+                <a:hlinkClick r:id="rId10" action="ppaction://hlinksldjump"/>
+              </a:rPr>
+              <a:t>Aktivacija profila</a:t>
+            </a:r>
+            <a:r>
+              <a:rPr lang="hr-HR" sz="1600" dirty="0" smtClean="0"/>
+              <a:t>”</a:t>
             </a:r>
           </a:p>
           <a:p>
@@ -3709,16 +3809,25 @@
             </a:pPr>
             <a:r>
               <a:rPr lang="hr-HR" sz="1600" dirty="0" smtClean="0"/>
-              <a:t> -Vodi u „Google </a:t>
-            </a:r>
-            <a:r>
-              <a:rPr lang="hr-HR" sz="1600" dirty="0" err="1" smtClean="0"/>
+              <a:t> -Vodi u „</a:t>
+            </a:r>
+            <a:r>
+              <a:rPr lang="hr-HR" sz="1600" dirty="0" smtClean="0">
+                <a:hlinkClick r:id="rId11" action="ppaction://hlinksldjump"/>
+              </a:rPr>
+              <a:t>Google </a:t>
+            </a:r>
+            <a:r>
+              <a:rPr lang="hr-HR" sz="1600" dirty="0" err="1" smtClean="0">
+                <a:hlinkClick r:id="rId11" action="ppaction://hlinksldjump"/>
+              </a:rPr>
               <a:t>maps</a:t>
             </a:r>
             <a:r>
               <a:rPr lang="hr-HR" sz="1600" dirty="0" smtClean="0"/>
-              <a:t> – pretraga rute”</a:t>
-            </a:r>
+              <a:t>”</a:t>
+            </a:r>
+            <a:endParaRPr lang="hr-HR" sz="1600" dirty="0" smtClean="0"/>
           </a:p>
           <a:p>
             <a:pPr marL="228600" indent="-228600">
@@ -3726,12 +3835,46 @@
             </a:pPr>
             <a:r>
               <a:rPr lang="hr-HR" sz="1600" dirty="0" smtClean="0"/>
-              <a:t>- Opcionalno </a:t>
+              <a:t>- </a:t>
+            </a:r>
+            <a:r>
+              <a:rPr lang="hr-HR" sz="1600" dirty="0" smtClean="0">
+                <a:hlinkClick r:id="rId12" action="ppaction://hlinksldjump"/>
+              </a:rPr>
+              <a:t>Opcionalno</a:t>
+            </a:r>
+            <a:r>
+              <a:rPr lang="hr-HR" sz="1600" dirty="0" smtClean="0"/>
+              <a:t> </a:t>
             </a:r>
             <a:r>
               <a:rPr lang="hr-HR" sz="1600" b="1" dirty="0" smtClean="0"/>
-              <a:t>(Diskusija potrebna)</a:t>
-            </a:r>
+              <a:t>(Diskusija potrebna</a:t>
+            </a:r>
+            <a:r>
+              <a:rPr lang="hr-HR" sz="1600" b="1" dirty="0" smtClean="0"/>
+              <a:t>)</a:t>
+            </a:r>
+          </a:p>
+          <a:p>
+            <a:pPr marL="228600" indent="-228600">
+              <a:buAutoNum type="arabicParenBoth"/>
+            </a:pPr>
+            <a:r>
+              <a:rPr lang="hr-HR" sz="1600" b="1" dirty="0"/>
+              <a:t> </a:t>
+            </a:r>
+            <a:r>
+              <a:rPr lang="hr-HR" sz="1600" b="1" dirty="0" smtClean="0"/>
+              <a:t>- </a:t>
+            </a:r>
+            <a:r>
+              <a:rPr lang="hr-HR" sz="1600" dirty="0" smtClean="0">
+                <a:hlinkClick r:id="rId13" action="ppaction://hlinksldjump"/>
+              </a:rPr>
+              <a:t>Završne napomene</a:t>
+            </a:r>
+            <a:endParaRPr lang="hr-HR" sz="1600" dirty="0" smtClean="0"/>
           </a:p>
         </p:txBody>
       </p:sp>
@@ -3798,6 +3941,916 @@
 </p:sld>
 </file>
 
+<file path=ppt/slides/slide10.xml><?xml version="1.0" encoding="utf-8"?>
+<p:sld xmlns:a="http://schemas.openxmlformats.org/drawingml/2006/main" xmlns:r="http://schemas.openxmlformats.org/officeDocument/2006/relationships" xmlns:p="http://schemas.openxmlformats.org/presentationml/2006/main">
+  <p:cSld>
+    <p:spTree>
+      <p:nvGrpSpPr>
+        <p:cNvPr id="1" name=""/>
+        <p:cNvGrpSpPr/>
+        <p:nvPr/>
+      </p:nvGrpSpPr>
+      <p:grpSpPr>
+        <a:xfrm>
+          <a:off x="0" y="0"/>
+          <a:ext cx="0" cy="0"/>
+          <a:chOff x="0" y="0"/>
+          <a:chExt cx="0" cy="0"/>
+        </a:xfrm>
+      </p:grpSpPr>
+      <p:sp>
+        <p:nvSpPr>
+          <p:cNvPr id="4" name="Zaobljeni pravokutnik 3"/>
+          <p:cNvSpPr/>
+          <p:nvPr/>
+        </p:nvSpPr>
+        <p:spPr>
+          <a:xfrm>
+            <a:off x="611713" y="316540"/>
+            <a:ext cx="3425125" cy="6168326"/>
+          </a:xfrm>
+          <a:prstGeom prst="roundRect">
+            <a:avLst/>
+          </a:prstGeom>
+          <a:noFill/>
+        </p:spPr>
+        <p:style>
+          <a:lnRef idx="2">
+            <a:schemeClr val="accent1">
+              <a:shade val="50000"/>
+            </a:schemeClr>
+          </a:lnRef>
+          <a:fillRef idx="1">
+            <a:schemeClr val="accent1"/>
+          </a:fillRef>
+          <a:effectRef idx="0">
+            <a:schemeClr val="accent1"/>
+          </a:effectRef>
+          <a:fontRef idx="minor">
+            <a:schemeClr val="lt1"/>
+          </a:fontRef>
+        </p:style>
+        <p:txBody>
+          <a:bodyPr rtlCol="0" anchor="ctr"/>
+          <a:lstStyle/>
+          <a:p>
+            <a:pPr algn="ctr"/>
+            <a:endParaRPr lang="hr-HR"/>
+          </a:p>
+        </p:txBody>
+      </p:sp>
+      <p:sp>
+        <p:nvSpPr>
+          <p:cNvPr id="5" name="TekstniOkvir 4"/>
+          <p:cNvSpPr txBox="1"/>
+          <p:nvPr/>
+        </p:nvSpPr>
+        <p:spPr>
+          <a:xfrm>
+            <a:off x="5838041" y="1392217"/>
+            <a:ext cx="3265715" cy="738664"/>
+          </a:xfrm>
+          <a:prstGeom prst="rect">
+            <a:avLst/>
+          </a:prstGeom>
+          <a:noFill/>
+        </p:spPr>
+        <p:txBody>
+          <a:bodyPr wrap="square" rtlCol="0">
+            <a:spAutoFit/>
+          </a:bodyPr>
+          <a:lstStyle/>
+          <a:p>
+            <a:pPr algn="ctr"/>
+            <a:r>
+              <a:rPr lang="hr-HR" sz="2800" dirty="0" smtClean="0"/>
+              <a:t>Aktivacija profila</a:t>
+            </a:r>
+          </a:p>
+          <a:p>
+            <a:r>
+              <a:rPr lang="hr-HR" sz="1400" dirty="0" smtClean="0"/>
+              <a:t>Aktivacija punog profila. </a:t>
+            </a:r>
+            <a:endParaRPr lang="hr-HR" sz="1400" dirty="0"/>
+          </a:p>
+        </p:txBody>
+      </p:sp>
+      <p:sp>
+        <p:nvSpPr>
+          <p:cNvPr id="6" name="Akcijski gumb: Povratak 5">
+            <a:hlinkClick r:id="" action="ppaction://hlinkshowjump?jump=firstslide" highlightClick="1"/>
+          </p:cNvPr>
+          <p:cNvSpPr/>
+          <p:nvPr/>
+        </p:nvSpPr>
+        <p:spPr>
+          <a:xfrm>
+            <a:off x="9906000" y="328902"/>
+            <a:ext cx="1620982" cy="1129572"/>
+          </a:xfrm>
+          <a:prstGeom prst="actionButtonReturn">
+            <a:avLst/>
+          </a:prstGeom>
+        </p:spPr>
+        <p:style>
+          <a:lnRef idx="2">
+            <a:schemeClr val="accent1">
+              <a:shade val="50000"/>
+            </a:schemeClr>
+          </a:lnRef>
+          <a:fillRef idx="1">
+            <a:schemeClr val="accent1"/>
+          </a:fillRef>
+          <a:effectRef idx="0">
+            <a:schemeClr val="accent1"/>
+          </a:effectRef>
+          <a:fontRef idx="minor">
+            <a:schemeClr val="lt1"/>
+          </a:fontRef>
+        </p:style>
+        <p:txBody>
+          <a:bodyPr rtlCol="0" anchor="ctr"/>
+          <a:lstStyle/>
+          <a:p>
+            <a:pPr algn="ctr"/>
+            <a:endParaRPr lang="hr-HR"/>
+          </a:p>
+        </p:txBody>
+      </p:sp>
+      <p:pic>
+        <p:nvPicPr>
+          <p:cNvPr id="7" name="Slika 6"/>
+          <p:cNvPicPr>
+            <a:picLocks noChangeAspect="1"/>
+          </p:cNvPicPr>
+          <p:nvPr/>
+        </p:nvPicPr>
+        <p:blipFill>
+          <a:blip r:embed="rId2" cstate="print">
+            <a:extLst>
+              <a:ext uri="{28A0092B-C50C-407E-A947-70E740481C1C}">
+                <a14:useLocalDpi xmlns:a14="http://schemas.microsoft.com/office/drawing/2010/main" val="0"/>
+              </a:ext>
+            </a:extLst>
+          </a:blip>
+          <a:stretch>
+            <a:fillRect/>
+          </a:stretch>
+        </p:blipFill>
+        <p:spPr>
+          <a:xfrm>
+            <a:off x="1000324" y="484321"/>
+            <a:ext cx="2624744" cy="5832764"/>
+          </a:xfrm>
+          <a:prstGeom prst="rect">
+            <a:avLst/>
+          </a:prstGeom>
+        </p:spPr>
+      </p:pic>
+    </p:spTree>
+    <p:extLst>
+      <p:ext uri="{BB962C8B-B14F-4D97-AF65-F5344CB8AC3E}">
+        <p14:creationId xmlns:p14="http://schemas.microsoft.com/office/powerpoint/2010/main" val="921899326"/>
+      </p:ext>
+    </p:extLst>
+  </p:cSld>
+  <p:clrMapOvr>
+    <a:masterClrMapping/>
+  </p:clrMapOvr>
+</p:sld>
+</file>
+
+<file path=ppt/slides/slide11.xml><?xml version="1.0" encoding="utf-8"?>
+<p:sld xmlns:a="http://schemas.openxmlformats.org/drawingml/2006/main" xmlns:r="http://schemas.openxmlformats.org/officeDocument/2006/relationships" xmlns:p="http://schemas.openxmlformats.org/presentationml/2006/main">
+  <p:cSld>
+    <p:spTree>
+      <p:nvGrpSpPr>
+        <p:cNvPr id="1" name=""/>
+        <p:cNvGrpSpPr/>
+        <p:nvPr/>
+      </p:nvGrpSpPr>
+      <p:grpSpPr>
+        <a:xfrm>
+          <a:off x="0" y="0"/>
+          <a:ext cx="0" cy="0"/>
+          <a:chOff x="0" y="0"/>
+          <a:chExt cx="0" cy="0"/>
+        </a:xfrm>
+      </p:grpSpPr>
+      <p:sp>
+        <p:nvSpPr>
+          <p:cNvPr id="4" name="Zaobljeni pravokutnik 3"/>
+          <p:cNvSpPr/>
+          <p:nvPr/>
+        </p:nvSpPr>
+        <p:spPr>
+          <a:xfrm>
+            <a:off x="611713" y="316540"/>
+            <a:ext cx="3425125" cy="6168326"/>
+          </a:xfrm>
+          <a:prstGeom prst="roundRect">
+            <a:avLst/>
+          </a:prstGeom>
+          <a:noFill/>
+        </p:spPr>
+        <p:style>
+          <a:lnRef idx="2">
+            <a:schemeClr val="accent1">
+              <a:shade val="50000"/>
+            </a:schemeClr>
+          </a:lnRef>
+          <a:fillRef idx="1">
+            <a:schemeClr val="accent1"/>
+          </a:fillRef>
+          <a:effectRef idx="0">
+            <a:schemeClr val="accent1"/>
+          </a:effectRef>
+          <a:fontRef idx="minor">
+            <a:schemeClr val="lt1"/>
+          </a:fontRef>
+        </p:style>
+        <p:txBody>
+          <a:bodyPr rtlCol="0" anchor="ctr"/>
+          <a:lstStyle/>
+          <a:p>
+            <a:pPr algn="ctr"/>
+            <a:endParaRPr lang="hr-HR"/>
+          </a:p>
+        </p:txBody>
+      </p:sp>
+      <p:sp>
+        <p:nvSpPr>
+          <p:cNvPr id="5" name="TekstniOkvir 4"/>
+          <p:cNvSpPr txBox="1"/>
+          <p:nvPr/>
+        </p:nvSpPr>
+        <p:spPr>
+          <a:xfrm>
+            <a:off x="5838041" y="1392217"/>
+            <a:ext cx="3541486" cy="738664"/>
+          </a:xfrm>
+          <a:prstGeom prst="rect">
+            <a:avLst/>
+          </a:prstGeom>
+          <a:noFill/>
+        </p:spPr>
+        <p:txBody>
+          <a:bodyPr wrap="square" rtlCol="0">
+            <a:spAutoFit/>
+          </a:bodyPr>
+          <a:lstStyle/>
+          <a:p>
+            <a:pPr algn="ctr"/>
+            <a:r>
+              <a:rPr lang="hr-HR" sz="2800" dirty="0" smtClean="0"/>
+              <a:t>Google </a:t>
+            </a:r>
+            <a:r>
+              <a:rPr lang="hr-HR" sz="2800" dirty="0" err="1" smtClean="0"/>
+              <a:t>maps</a:t>
+            </a:r>
+            <a:r>
+              <a:rPr lang="hr-HR" sz="2800" dirty="0" smtClean="0"/>
+              <a:t> </a:t>
+            </a:r>
+          </a:p>
+          <a:p>
+            <a:r>
+              <a:rPr lang="hr-HR" sz="1400" dirty="0" smtClean="0"/>
+              <a:t>Prikazuje sve stanice na karti. </a:t>
+            </a:r>
+            <a:endParaRPr lang="hr-HR" sz="1400" dirty="0"/>
+          </a:p>
+        </p:txBody>
+      </p:sp>
+      <p:sp>
+        <p:nvSpPr>
+          <p:cNvPr id="6" name="Akcijski gumb: Povratak 5">
+            <a:hlinkClick r:id="" action="ppaction://hlinkshowjump?jump=firstslide" highlightClick="1"/>
+          </p:cNvPr>
+          <p:cNvSpPr/>
+          <p:nvPr/>
+        </p:nvSpPr>
+        <p:spPr>
+          <a:xfrm>
+            <a:off x="9906000" y="328902"/>
+            <a:ext cx="1620982" cy="1129572"/>
+          </a:xfrm>
+          <a:prstGeom prst="actionButtonReturn">
+            <a:avLst/>
+          </a:prstGeom>
+        </p:spPr>
+        <p:style>
+          <a:lnRef idx="2">
+            <a:schemeClr val="accent1">
+              <a:shade val="50000"/>
+            </a:schemeClr>
+          </a:lnRef>
+          <a:fillRef idx="1">
+            <a:schemeClr val="accent1"/>
+          </a:fillRef>
+          <a:effectRef idx="0">
+            <a:schemeClr val="accent1"/>
+          </a:effectRef>
+          <a:fontRef idx="minor">
+            <a:schemeClr val="lt1"/>
+          </a:fontRef>
+        </p:style>
+        <p:txBody>
+          <a:bodyPr rtlCol="0" anchor="ctr"/>
+          <a:lstStyle/>
+          <a:p>
+            <a:pPr algn="ctr"/>
+            <a:endParaRPr lang="hr-HR"/>
+          </a:p>
+        </p:txBody>
+      </p:sp>
+      <p:pic>
+        <p:nvPicPr>
+          <p:cNvPr id="7" name="Slika 6"/>
+          <p:cNvPicPr>
+            <a:picLocks noChangeAspect="1"/>
+          </p:cNvPicPr>
+          <p:nvPr/>
+        </p:nvPicPr>
+        <p:blipFill>
+          <a:blip r:embed="rId2" cstate="print">
+            <a:extLst>
+              <a:ext uri="{28A0092B-C50C-407E-A947-70E740481C1C}">
+                <a14:useLocalDpi xmlns:a14="http://schemas.microsoft.com/office/drawing/2010/main" val="0"/>
+              </a:ext>
+            </a:extLst>
+          </a:blip>
+          <a:stretch>
+            <a:fillRect/>
+          </a:stretch>
+        </p:blipFill>
+        <p:spPr>
+          <a:xfrm>
+            <a:off x="886691" y="456611"/>
+            <a:ext cx="2951886" cy="5888183"/>
+          </a:xfrm>
+          <a:prstGeom prst="rect">
+            <a:avLst/>
+          </a:prstGeom>
+        </p:spPr>
+      </p:pic>
+    </p:spTree>
+    <p:extLst>
+      <p:ext uri="{BB962C8B-B14F-4D97-AF65-F5344CB8AC3E}">
+        <p14:creationId xmlns:p14="http://schemas.microsoft.com/office/powerpoint/2010/main" val="1928533104"/>
+      </p:ext>
+    </p:extLst>
+  </p:cSld>
+  <p:clrMapOvr>
+    <a:masterClrMapping/>
+  </p:clrMapOvr>
+</p:sld>
+</file>
+
+<file path=ppt/slides/slide12.xml><?xml version="1.0" encoding="utf-8"?>
+<p:sld xmlns:a="http://schemas.openxmlformats.org/drawingml/2006/main" xmlns:r="http://schemas.openxmlformats.org/officeDocument/2006/relationships" xmlns:p="http://schemas.openxmlformats.org/presentationml/2006/main">
+  <p:cSld>
+    <p:spTree>
+      <p:nvGrpSpPr>
+        <p:cNvPr id="1" name=""/>
+        <p:cNvGrpSpPr/>
+        <p:nvPr/>
+      </p:nvGrpSpPr>
+      <p:grpSpPr>
+        <a:xfrm>
+          <a:off x="0" y="0"/>
+          <a:ext cx="0" cy="0"/>
+          <a:chOff x="0" y="0"/>
+          <a:chExt cx="0" cy="0"/>
+        </a:xfrm>
+      </p:grpSpPr>
+      <p:sp>
+        <p:nvSpPr>
+          <p:cNvPr id="4" name="Zaobljeni pravokutnik 3"/>
+          <p:cNvSpPr/>
+          <p:nvPr/>
+        </p:nvSpPr>
+        <p:spPr>
+          <a:xfrm>
+            <a:off x="611713" y="316540"/>
+            <a:ext cx="3425125" cy="6168326"/>
+          </a:xfrm>
+          <a:prstGeom prst="roundRect">
+            <a:avLst/>
+          </a:prstGeom>
+          <a:noFill/>
+        </p:spPr>
+        <p:style>
+          <a:lnRef idx="2">
+            <a:schemeClr val="accent1">
+              <a:shade val="50000"/>
+            </a:schemeClr>
+          </a:lnRef>
+          <a:fillRef idx="1">
+            <a:schemeClr val="accent1"/>
+          </a:fillRef>
+          <a:effectRef idx="0">
+            <a:schemeClr val="accent1"/>
+          </a:effectRef>
+          <a:fontRef idx="minor">
+            <a:schemeClr val="lt1"/>
+          </a:fontRef>
+        </p:style>
+        <p:txBody>
+          <a:bodyPr rtlCol="0" anchor="ctr"/>
+          <a:lstStyle/>
+          <a:p>
+            <a:pPr algn="ctr"/>
+            <a:endParaRPr lang="hr-HR"/>
+          </a:p>
+        </p:txBody>
+      </p:sp>
+      <p:sp>
+        <p:nvSpPr>
+          <p:cNvPr id="5" name="TekstniOkvir 4"/>
+          <p:cNvSpPr txBox="1"/>
+          <p:nvPr/>
+        </p:nvSpPr>
+        <p:spPr>
+          <a:xfrm>
+            <a:off x="5838041" y="1392217"/>
+            <a:ext cx="3265715" cy="1169551"/>
+          </a:xfrm>
+          <a:prstGeom prst="rect">
+            <a:avLst/>
+          </a:prstGeom>
+          <a:noFill/>
+        </p:spPr>
+        <p:txBody>
+          <a:bodyPr wrap="square" rtlCol="0">
+            <a:spAutoFit/>
+          </a:bodyPr>
+          <a:lstStyle/>
+          <a:p>
+            <a:pPr algn="ctr"/>
+            <a:r>
+              <a:rPr lang="hr-HR" sz="2800" dirty="0" smtClean="0"/>
+              <a:t>Opcionalno</a:t>
+            </a:r>
+          </a:p>
+          <a:p>
+            <a:r>
+              <a:rPr lang="hr-HR" sz="1400" dirty="0" smtClean="0"/>
+              <a:t>Na web verziji, ima karta koja prikazuje sve </a:t>
+            </a:r>
+            <a:r>
+              <a:rPr lang="hr-HR" sz="1400" dirty="0" err="1" smtClean="0"/>
+              <a:t>buseve</a:t>
+            </a:r>
+            <a:r>
+              <a:rPr lang="hr-HR" sz="1400" dirty="0" smtClean="0"/>
+              <a:t> u trenutnom vremenu i kako se kreću. Trebamo li to implementirati?</a:t>
+            </a:r>
+            <a:endParaRPr lang="hr-HR" sz="1400" dirty="0"/>
+          </a:p>
+        </p:txBody>
+      </p:sp>
+      <p:sp>
+        <p:nvSpPr>
+          <p:cNvPr id="6" name="Akcijski gumb: Povratak 5">
+            <a:hlinkClick r:id="" action="ppaction://hlinkshowjump?jump=firstslide" highlightClick="1"/>
+          </p:cNvPr>
+          <p:cNvSpPr/>
+          <p:nvPr/>
+        </p:nvSpPr>
+        <p:spPr>
+          <a:xfrm>
+            <a:off x="9906000" y="328902"/>
+            <a:ext cx="1620982" cy="1129572"/>
+          </a:xfrm>
+          <a:prstGeom prst="actionButtonReturn">
+            <a:avLst/>
+          </a:prstGeom>
+        </p:spPr>
+        <p:style>
+          <a:lnRef idx="2">
+            <a:schemeClr val="accent1">
+              <a:shade val="50000"/>
+            </a:schemeClr>
+          </a:lnRef>
+          <a:fillRef idx="1">
+            <a:schemeClr val="accent1"/>
+          </a:fillRef>
+          <a:effectRef idx="0">
+            <a:schemeClr val="accent1"/>
+          </a:effectRef>
+          <a:fontRef idx="minor">
+            <a:schemeClr val="lt1"/>
+          </a:fontRef>
+        </p:style>
+        <p:txBody>
+          <a:bodyPr rtlCol="0" anchor="ctr"/>
+          <a:lstStyle/>
+          <a:p>
+            <a:pPr algn="ctr"/>
+            <a:endParaRPr lang="hr-HR"/>
+          </a:p>
+        </p:txBody>
+      </p:sp>
+    </p:spTree>
+    <p:extLst>
+      <p:ext uri="{BB962C8B-B14F-4D97-AF65-F5344CB8AC3E}">
+        <p14:creationId xmlns:p14="http://schemas.microsoft.com/office/powerpoint/2010/main" val="2242934467"/>
+      </p:ext>
+    </p:extLst>
+  </p:cSld>
+  <p:clrMapOvr>
+    <a:masterClrMapping/>
+  </p:clrMapOvr>
+</p:sld>
+</file>
+
+<file path=ppt/slides/slide13.xml><?xml version="1.0" encoding="utf-8"?>
+<p:sld xmlns:a="http://schemas.openxmlformats.org/drawingml/2006/main" xmlns:r="http://schemas.openxmlformats.org/officeDocument/2006/relationships" xmlns:p="http://schemas.openxmlformats.org/presentationml/2006/main">
+  <p:cSld>
+    <p:spTree>
+      <p:nvGrpSpPr>
+        <p:cNvPr id="1" name=""/>
+        <p:cNvGrpSpPr/>
+        <p:nvPr/>
+      </p:nvGrpSpPr>
+      <p:grpSpPr>
+        <a:xfrm>
+          <a:off x="0" y="0"/>
+          <a:ext cx="0" cy="0"/>
+          <a:chOff x="0" y="0"/>
+          <a:chExt cx="0" cy="0"/>
+        </a:xfrm>
+      </p:grpSpPr>
+      <p:sp>
+        <p:nvSpPr>
+          <p:cNvPr id="4" name="Akcijski gumb: Povratak 3">
+            <a:hlinkClick r:id="" action="ppaction://hlinkshowjump?jump=firstslide" highlightClick="1"/>
+          </p:cNvPr>
+          <p:cNvSpPr/>
+          <p:nvPr/>
+        </p:nvSpPr>
+        <p:spPr>
+          <a:xfrm>
+            <a:off x="9906000" y="328902"/>
+            <a:ext cx="1620982" cy="1129572"/>
+          </a:xfrm>
+          <a:prstGeom prst="actionButtonReturn">
+            <a:avLst/>
+          </a:prstGeom>
+        </p:spPr>
+        <p:style>
+          <a:lnRef idx="2">
+            <a:schemeClr val="accent1">
+              <a:shade val="50000"/>
+            </a:schemeClr>
+          </a:lnRef>
+          <a:fillRef idx="1">
+            <a:schemeClr val="accent1"/>
+          </a:fillRef>
+          <a:effectRef idx="0">
+            <a:schemeClr val="accent1"/>
+          </a:effectRef>
+          <a:fontRef idx="minor">
+            <a:schemeClr val="lt1"/>
+          </a:fontRef>
+        </p:style>
+        <p:txBody>
+          <a:bodyPr rtlCol="0" anchor="ctr"/>
+          <a:lstStyle/>
+          <a:p>
+            <a:pPr algn="ctr"/>
+            <a:endParaRPr lang="hr-HR"/>
+          </a:p>
+        </p:txBody>
+      </p:sp>
+      <p:sp>
+        <p:nvSpPr>
+          <p:cNvPr id="5" name="TekstniOkvir 4"/>
+          <p:cNvSpPr txBox="1"/>
+          <p:nvPr/>
+        </p:nvSpPr>
+        <p:spPr>
+          <a:xfrm>
+            <a:off x="2646218" y="1870364"/>
+            <a:ext cx="5112327" cy="923330"/>
+          </a:xfrm>
+          <a:prstGeom prst="rect">
+            <a:avLst/>
+          </a:prstGeom>
+          <a:noFill/>
+        </p:spPr>
+        <p:txBody>
+          <a:bodyPr wrap="square" rtlCol="0">
+            <a:spAutoFit/>
+          </a:bodyPr>
+          <a:lstStyle/>
+          <a:p>
+            <a:r>
+              <a:rPr lang="hr-HR" dirty="0" smtClean="0"/>
+              <a:t>Trebamo li napraviti </a:t>
+            </a:r>
+            <a:r>
+              <a:rPr lang="hr-HR" dirty="0" err="1" smtClean="0"/>
+              <a:t>admin</a:t>
+            </a:r>
+            <a:r>
+              <a:rPr lang="hr-HR" dirty="0" smtClean="0"/>
+              <a:t> verziju aplikacije? Je li to previše?</a:t>
+            </a:r>
+          </a:p>
+          <a:p>
+            <a:endParaRPr lang="hr-HR" dirty="0"/>
+          </a:p>
+        </p:txBody>
+      </p:sp>
+      <p:sp>
+        <p:nvSpPr>
+          <p:cNvPr id="6" name="TekstniOkvir 5"/>
+          <p:cNvSpPr txBox="1"/>
+          <p:nvPr/>
+        </p:nvSpPr>
+        <p:spPr>
+          <a:xfrm>
+            <a:off x="789710" y="2918385"/>
+            <a:ext cx="5195454" cy="2862322"/>
+          </a:xfrm>
+          <a:prstGeom prst="rect">
+            <a:avLst/>
+          </a:prstGeom>
+          <a:noFill/>
+        </p:spPr>
+        <p:txBody>
+          <a:bodyPr wrap="square" rtlCol="0">
+            <a:spAutoFit/>
+          </a:bodyPr>
+          <a:lstStyle/>
+          <a:p>
+            <a:pPr marL="285750" indent="-285750">
+              <a:buFont typeface="Arial" panose="020B0604020202020204" pitchFamily="34" charset="0"/>
+              <a:buChar char="•"/>
+            </a:pPr>
+            <a:r>
+              <a:rPr lang="hr-HR" dirty="0" err="1" smtClean="0"/>
+              <a:t>Backend</a:t>
+            </a:r>
+            <a:r>
+              <a:rPr lang="hr-HR" dirty="0" smtClean="0"/>
+              <a:t>: </a:t>
+            </a:r>
+            <a:r>
+              <a:rPr lang="hr-HR" dirty="0" err="1" smtClean="0"/>
+              <a:t>Supabase</a:t>
+            </a:r>
+            <a:r>
+              <a:rPr lang="hr-HR" dirty="0" smtClean="0"/>
+              <a:t>, </a:t>
+            </a:r>
+            <a:r>
+              <a:rPr lang="hr-HR" dirty="0" err="1" smtClean="0"/>
+              <a:t>Firebase</a:t>
+            </a:r>
+            <a:r>
+              <a:rPr lang="hr-HR" dirty="0" smtClean="0"/>
+              <a:t>, </a:t>
+            </a:r>
+            <a:r>
+              <a:rPr lang="hr-HR" dirty="0" err="1" smtClean="0"/>
+              <a:t>Appwrite</a:t>
+            </a:r>
+            <a:r>
+              <a:rPr lang="hr-HR" dirty="0" smtClean="0"/>
+              <a:t>, Back4App</a:t>
+            </a:r>
+          </a:p>
+          <a:p>
+            <a:pPr marL="285750" indent="-285750">
+              <a:buFont typeface="Arial" panose="020B0604020202020204" pitchFamily="34" charset="0"/>
+              <a:buChar char="•"/>
+            </a:pPr>
+            <a:r>
+              <a:rPr lang="hr-HR" dirty="0" smtClean="0"/>
+              <a:t>Za bazu chat preporučuje Back4App (</a:t>
+            </a:r>
+            <a:r>
+              <a:rPr lang="hr-HR" dirty="0" err="1" smtClean="0"/>
+              <a:t>beginer-friendly</a:t>
+            </a:r>
+            <a:r>
+              <a:rPr lang="hr-HR" dirty="0" smtClean="0"/>
+              <a:t>) ili </a:t>
+            </a:r>
+            <a:r>
+              <a:rPr lang="hr-HR" dirty="0" err="1" smtClean="0"/>
+              <a:t>SupraBase</a:t>
+            </a:r>
+            <a:endParaRPr lang="hr-HR" dirty="0" smtClean="0"/>
+          </a:p>
+          <a:p>
+            <a:pPr marL="285750" indent="-285750">
+              <a:buFont typeface="Arial" panose="020B0604020202020204" pitchFamily="34" charset="0"/>
+              <a:buChar char="•"/>
+            </a:pPr>
+            <a:r>
+              <a:rPr lang="hr-HR" dirty="0" smtClean="0"/>
+              <a:t>Što se tiče podataka u bazi, moja je pretpostavka: </a:t>
+            </a:r>
+          </a:p>
+          <a:p>
+            <a:pPr marL="742950" lvl="1" indent="-285750">
+              <a:buFont typeface="Arial" panose="020B0604020202020204" pitchFamily="34" charset="0"/>
+              <a:buChar char="•"/>
+            </a:pPr>
+            <a:r>
+              <a:rPr lang="hr-HR" dirty="0" smtClean="0"/>
+              <a:t>Korisnički podaci</a:t>
+            </a:r>
+          </a:p>
+          <a:p>
+            <a:pPr marL="742950" lvl="1" indent="-285750">
+              <a:buFont typeface="Arial" panose="020B0604020202020204" pitchFamily="34" charset="0"/>
+              <a:buChar char="•"/>
+            </a:pPr>
+            <a:r>
+              <a:rPr lang="hr-HR" dirty="0" smtClean="0"/>
+              <a:t>Bankovni podaci</a:t>
+            </a:r>
+          </a:p>
+          <a:p>
+            <a:pPr marL="742950" lvl="1" indent="-285750">
+              <a:buFont typeface="Arial" panose="020B0604020202020204" pitchFamily="34" charset="0"/>
+              <a:buChar char="•"/>
+            </a:pPr>
+            <a:r>
+              <a:rPr lang="hr-HR" dirty="0" smtClean="0"/>
+              <a:t>Podatci o kartama</a:t>
+            </a:r>
+          </a:p>
+          <a:p>
+            <a:pPr marL="742950" lvl="1" indent="-285750">
+              <a:buFont typeface="Arial" panose="020B0604020202020204" pitchFamily="34" charset="0"/>
+              <a:buChar char="•"/>
+            </a:pPr>
+            <a:r>
+              <a:rPr lang="hr-HR" dirty="0" smtClean="0"/>
+              <a:t>Možda podaci o lokaciji </a:t>
+            </a:r>
+            <a:r>
+              <a:rPr lang="hr-HR" dirty="0" err="1" smtClean="0"/>
+              <a:t>buseva</a:t>
+            </a:r>
+            <a:r>
+              <a:rPr lang="hr-HR" dirty="0" smtClean="0"/>
+              <a:t> vezano za karte ili prikaz na karti</a:t>
+            </a:r>
+            <a:endParaRPr lang="hr-HR" dirty="0"/>
+          </a:p>
+          <a:p>
+            <a:pPr marL="742950" lvl="1" indent="-285750">
+              <a:buFont typeface="Arial" panose="020B0604020202020204" pitchFamily="34" charset="0"/>
+              <a:buChar char="•"/>
+            </a:pPr>
+            <a:endParaRPr lang="hr-HR" dirty="0" smtClean="0"/>
+          </a:p>
+        </p:txBody>
+      </p:sp>
+      <p:sp>
+        <p:nvSpPr>
+          <p:cNvPr id="21" name="TekstniOkvir 20"/>
+          <p:cNvSpPr txBox="1"/>
+          <p:nvPr/>
+        </p:nvSpPr>
+        <p:spPr>
+          <a:xfrm>
+            <a:off x="6677891" y="2793694"/>
+            <a:ext cx="4849091" cy="1477328"/>
+          </a:xfrm>
+          <a:prstGeom prst="rect">
+            <a:avLst/>
+          </a:prstGeom>
+          <a:noFill/>
+        </p:spPr>
+        <p:txBody>
+          <a:bodyPr wrap="square" rtlCol="0">
+            <a:spAutoFit/>
+          </a:bodyPr>
+          <a:lstStyle/>
+          <a:p>
+            <a:pPr marL="285750" indent="-285750">
+              <a:buFont typeface="Arial" panose="020B0604020202020204" pitchFamily="34" charset="0"/>
+              <a:buChar char="•"/>
+            </a:pPr>
+            <a:r>
+              <a:rPr lang="hr-HR" dirty="0" smtClean="0"/>
+              <a:t>Netko treba napravit </a:t>
+            </a:r>
+            <a:r>
+              <a:rPr lang="hr-HR" dirty="0" err="1" smtClean="0"/>
+              <a:t>autentifikaciju</a:t>
+            </a:r>
+            <a:r>
+              <a:rPr lang="hr-HR" dirty="0" smtClean="0"/>
+              <a:t>: </a:t>
+            </a:r>
+            <a:r>
+              <a:rPr lang="hr-HR" dirty="0" err="1" smtClean="0"/>
+              <a:t>Firebase</a:t>
+            </a:r>
+            <a:r>
+              <a:rPr lang="hr-HR" dirty="0" smtClean="0"/>
+              <a:t>, </a:t>
+            </a:r>
+            <a:r>
+              <a:rPr lang="hr-HR" dirty="0" err="1" smtClean="0"/>
+              <a:t>Supabase</a:t>
+            </a:r>
+            <a:r>
+              <a:rPr lang="hr-HR" dirty="0" smtClean="0"/>
+              <a:t>, </a:t>
+            </a:r>
+            <a:r>
+              <a:rPr lang="hr-HR" dirty="0" err="1" smtClean="0"/>
+              <a:t>Appwrite</a:t>
+            </a:r>
+            <a:endParaRPr lang="hr-HR" dirty="0" smtClean="0"/>
+          </a:p>
+          <a:p>
+            <a:pPr marL="285750" indent="-285750">
+              <a:buFont typeface="Arial" panose="020B0604020202020204" pitchFamily="34" charset="0"/>
+              <a:buChar char="•"/>
+            </a:pPr>
+            <a:r>
+              <a:rPr lang="hr-HR" dirty="0" smtClean="0"/>
+              <a:t>API, </a:t>
+            </a:r>
+            <a:r>
+              <a:rPr lang="hr-HR" dirty="0" err="1" smtClean="0"/>
+              <a:t>nzn</a:t>
+            </a:r>
+            <a:r>
+              <a:rPr lang="hr-HR" dirty="0" smtClean="0"/>
+              <a:t> </a:t>
+            </a:r>
+            <a:r>
+              <a:rPr lang="hr-HR" dirty="0" err="1" smtClean="0"/>
+              <a:t>tolko</a:t>
+            </a:r>
+            <a:r>
+              <a:rPr lang="hr-HR" dirty="0" smtClean="0"/>
+              <a:t> što ćemo za ovo</a:t>
+            </a:r>
+          </a:p>
+          <a:p>
+            <a:pPr marL="285750" indent="-285750">
+              <a:buFont typeface="Arial" panose="020B0604020202020204" pitchFamily="34" charset="0"/>
+              <a:buChar char="•"/>
+            </a:pPr>
+            <a:r>
+              <a:rPr lang="hr-HR" dirty="0" smtClean="0"/>
+              <a:t>Hosting (mjesto di ćemo pokrenuti </a:t>
+            </a:r>
+            <a:r>
+              <a:rPr lang="hr-HR" dirty="0" err="1" smtClean="0"/>
+              <a:t>backed</a:t>
+            </a:r>
+            <a:r>
+              <a:rPr lang="hr-HR" dirty="0" smtClean="0"/>
+              <a:t>): </a:t>
+            </a:r>
+            <a:r>
+              <a:rPr lang="hr-HR" dirty="0" err="1" smtClean="0"/>
+              <a:t>Supabase</a:t>
+            </a:r>
+            <a:r>
+              <a:rPr lang="hr-HR" dirty="0" smtClean="0"/>
+              <a:t>, </a:t>
+            </a:r>
+            <a:r>
+              <a:rPr lang="hr-HR" dirty="0" err="1" smtClean="0"/>
+              <a:t>Firebase</a:t>
+            </a:r>
+            <a:r>
+              <a:rPr lang="hr-HR" dirty="0" smtClean="0"/>
+              <a:t> ga imaju ugrađeno</a:t>
+            </a:r>
+          </a:p>
+        </p:txBody>
+      </p:sp>
+    </p:spTree>
+    <p:extLst>
+      <p:ext uri="{BB962C8B-B14F-4D97-AF65-F5344CB8AC3E}">
+        <p14:creationId xmlns:p14="http://schemas.microsoft.com/office/powerpoint/2010/main" val="3959549436"/>
+      </p:ext>
+    </p:extLst>
+  </p:cSld>
+  <p:clrMapOvr>
+    <a:masterClrMapping/>
+  </p:clrMapOvr>
+</p:sld>
+</file>
+
 <file path=ppt/slides/slide2.xml><?xml version="1.0" encoding="utf-8"?>
 <p:sld xmlns:a="http://schemas.openxmlformats.org/drawingml/2006/main" xmlns:r="http://schemas.openxmlformats.org/officeDocument/2006/relationships" xmlns:p="http://schemas.openxmlformats.org/presentationml/2006/main">
   <p:cSld>
@@ -3823,8 +4876,8 @@
         </p:nvSpPr>
         <p:spPr>
           <a:xfrm>
-            <a:off x="5907314" y="371959"/>
-            <a:ext cx="3265715" cy="523220"/>
+            <a:off x="5644078" y="1780144"/>
+            <a:ext cx="3265715" cy="1600438"/>
           </a:xfrm>
           <a:prstGeom prst="rect">
             <a:avLst/>
@@ -3843,6 +4896,25 @@
               <a:t>Obavijesti</a:t>
             </a:r>
             <a:endParaRPr lang="hr-HR" sz="2800" dirty="0"/>
+          </a:p>
+          <a:p>
+            <a:pPr marL="342900" indent="-342900">
+              <a:buAutoNum type="arabicParenBoth"/>
+            </a:pPr>
+            <a:r>
+              <a:rPr lang="hr-HR" sz="1400" dirty="0" smtClean="0"/>
+              <a:t>– kad se uđe na obavijesti, korisniku se ispišu poruke od prometa</a:t>
+            </a:r>
+            <a:endParaRPr lang="hr-HR" sz="1400" dirty="0"/>
+          </a:p>
+          <a:p>
+            <a:pPr marL="342900" indent="-342900">
+              <a:buAutoNum type="arabicParenBoth"/>
+            </a:pPr>
+            <a:r>
+              <a:rPr lang="hr-HR" sz="1400" dirty="0" smtClean="0"/>
+              <a:t>- kad se upre na personalizirano, korisnik dobiva personalizirane poruke od prometa (ako ih ima)</a:t>
+            </a:r>
           </a:p>
         </p:txBody>
       </p:sp>
@@ -3887,10 +4959,1558 @@
           </a:p>
         </p:txBody>
       </p:sp>
+      <p:sp>
+        <p:nvSpPr>
+          <p:cNvPr id="2" name="TekstniOkvir 1"/>
+          <p:cNvSpPr txBox="1"/>
+          <p:nvPr/>
+        </p:nvSpPr>
+        <p:spPr>
+          <a:xfrm>
+            <a:off x="1264402" y="521107"/>
+            <a:ext cx="1981200" cy="374072"/>
+          </a:xfrm>
+          <a:prstGeom prst="rect">
+            <a:avLst/>
+          </a:prstGeom>
+          <a:noFill/>
+        </p:spPr>
+        <p:txBody>
+          <a:bodyPr wrap="square" rtlCol="0">
+            <a:spAutoFit/>
+          </a:bodyPr>
+          <a:lstStyle/>
+          <a:p>
+            <a:pPr algn="ctr"/>
+            <a:r>
+              <a:rPr lang="hr-HR" dirty="0" smtClean="0"/>
+              <a:t>Obavijesti</a:t>
+            </a:r>
+            <a:endParaRPr lang="hr-HR" dirty="0"/>
+          </a:p>
+        </p:txBody>
+      </p:sp>
+      <p:sp>
+        <p:nvSpPr>
+          <p:cNvPr id="3" name="TekstniOkvir 2"/>
+          <p:cNvSpPr txBox="1"/>
+          <p:nvPr/>
+        </p:nvSpPr>
+        <p:spPr>
+          <a:xfrm>
+            <a:off x="749965" y="1122218"/>
+            <a:ext cx="1231235" cy="369332"/>
+          </a:xfrm>
+          <a:prstGeom prst="rect">
+            <a:avLst/>
+          </a:prstGeom>
+          <a:noFill/>
+        </p:spPr>
+        <p:txBody>
+          <a:bodyPr wrap="square" rtlCol="0">
+            <a:spAutoFit/>
+          </a:bodyPr>
+          <a:lstStyle/>
+          <a:p>
+            <a:r>
+              <a:rPr lang="hr-HR" dirty="0" smtClean="0"/>
+              <a:t>Promet (1)</a:t>
+            </a:r>
+            <a:endParaRPr lang="hr-HR" dirty="0"/>
+          </a:p>
+        </p:txBody>
+      </p:sp>
+      <p:sp>
+        <p:nvSpPr>
+          <p:cNvPr id="6" name="TekstniOkvir 5"/>
+          <p:cNvSpPr txBox="1"/>
+          <p:nvPr/>
+        </p:nvSpPr>
+        <p:spPr>
+          <a:xfrm>
+            <a:off x="1981200" y="1132199"/>
+            <a:ext cx="2067673" cy="369332"/>
+          </a:xfrm>
+          <a:prstGeom prst="rect">
+            <a:avLst/>
+          </a:prstGeom>
+          <a:noFill/>
+        </p:spPr>
+        <p:txBody>
+          <a:bodyPr wrap="square" rtlCol="0">
+            <a:spAutoFit/>
+          </a:bodyPr>
+          <a:lstStyle/>
+          <a:p>
+            <a:r>
+              <a:rPr lang="hr-HR" dirty="0" smtClean="0"/>
+              <a:t>Personalizirano (2)</a:t>
+            </a:r>
+            <a:endParaRPr lang="hr-HR" dirty="0"/>
+          </a:p>
+        </p:txBody>
+      </p:sp>
+      <p:sp>
+        <p:nvSpPr>
+          <p:cNvPr id="7" name="TekstniOkvir 6"/>
+          <p:cNvSpPr txBox="1"/>
+          <p:nvPr/>
+        </p:nvSpPr>
+        <p:spPr>
+          <a:xfrm>
+            <a:off x="871250" y="1780144"/>
+            <a:ext cx="2767503" cy="923330"/>
+          </a:xfrm>
+          <a:prstGeom prst="rect">
+            <a:avLst/>
+          </a:prstGeom>
+          <a:noFill/>
+          <a:ln>
+            <a:solidFill>
+              <a:schemeClr val="tx1"/>
+            </a:solidFill>
+          </a:ln>
+        </p:spPr>
+        <p:txBody>
+          <a:bodyPr wrap="square" rtlCol="0">
+            <a:spAutoFit/>
+          </a:bodyPr>
+          <a:lstStyle/>
+          <a:p>
+            <a:r>
+              <a:rPr lang="hr-HR" dirty="0" smtClean="0"/>
+              <a:t>cccccccccccccccccccccccccccccccccccccccccccccccccccccccccccccccccccccccccc</a:t>
+            </a:r>
+            <a:endParaRPr lang="hr-HR" dirty="0"/>
+          </a:p>
+        </p:txBody>
+      </p:sp>
+      <p:sp>
+        <p:nvSpPr>
+          <p:cNvPr id="8" name="TekstniOkvir 7"/>
+          <p:cNvSpPr txBox="1"/>
+          <p:nvPr/>
+        </p:nvSpPr>
+        <p:spPr>
+          <a:xfrm>
+            <a:off x="871250" y="3126774"/>
+            <a:ext cx="2630544" cy="923330"/>
+          </a:xfrm>
+          <a:prstGeom prst="rect">
+            <a:avLst/>
+          </a:prstGeom>
+          <a:noFill/>
+          <a:ln>
+            <a:solidFill>
+              <a:schemeClr val="tx1"/>
+            </a:solidFill>
+          </a:ln>
+        </p:spPr>
+        <p:txBody>
+          <a:bodyPr wrap="square" rtlCol="0">
+            <a:spAutoFit/>
+          </a:bodyPr>
+          <a:lstStyle/>
+          <a:p>
+            <a:r>
+              <a:rPr lang="hr-HR" dirty="0" err="1" smtClean="0"/>
+              <a:t>cccccccccccccccccccccccccccccccccccccccccccccccccccccccccc</a:t>
+            </a:r>
+            <a:endParaRPr lang="hr-HR" dirty="0"/>
+          </a:p>
+        </p:txBody>
+      </p:sp>
+      <p:sp>
+        <p:nvSpPr>
+          <p:cNvPr id="9" name="TekstniOkvir 8"/>
+          <p:cNvSpPr txBox="1"/>
+          <p:nvPr/>
+        </p:nvSpPr>
+        <p:spPr>
+          <a:xfrm>
+            <a:off x="871250" y="4471790"/>
+            <a:ext cx="2462703" cy="923330"/>
+          </a:xfrm>
+          <a:prstGeom prst="rect">
+            <a:avLst/>
+          </a:prstGeom>
+          <a:noFill/>
+          <a:ln>
+            <a:solidFill>
+              <a:schemeClr val="tx1"/>
+            </a:solidFill>
+          </a:ln>
+        </p:spPr>
+        <p:txBody>
+          <a:bodyPr wrap="square" rtlCol="0">
+            <a:spAutoFit/>
+          </a:bodyPr>
+          <a:lstStyle/>
+          <a:p>
+            <a:r>
+              <a:rPr lang="hr-HR" dirty="0" err="1" smtClean="0"/>
+              <a:t>cccccccccccccccccccccccccccccccccccccccccccccccccccccccc</a:t>
+            </a:r>
+            <a:endParaRPr lang="hr-HR" dirty="0"/>
+          </a:p>
+        </p:txBody>
+      </p:sp>
+      <p:sp>
+        <p:nvSpPr>
+          <p:cNvPr id="10" name="Akcijski gumb: Povratak 9">
+            <a:hlinkClick r:id="" action="ppaction://hlinkshowjump?jump=firstslide" highlightClick="1"/>
+          </p:cNvPr>
+          <p:cNvSpPr/>
+          <p:nvPr/>
+        </p:nvSpPr>
+        <p:spPr>
+          <a:xfrm>
+            <a:off x="9906000" y="328902"/>
+            <a:ext cx="1620982" cy="1129572"/>
+          </a:xfrm>
+          <a:prstGeom prst="actionButtonReturn">
+            <a:avLst/>
+          </a:prstGeom>
+        </p:spPr>
+        <p:style>
+          <a:lnRef idx="2">
+            <a:schemeClr val="accent1">
+              <a:shade val="50000"/>
+            </a:schemeClr>
+          </a:lnRef>
+          <a:fillRef idx="1">
+            <a:schemeClr val="accent1"/>
+          </a:fillRef>
+          <a:effectRef idx="0">
+            <a:schemeClr val="accent1"/>
+          </a:effectRef>
+          <a:fontRef idx="minor">
+            <a:schemeClr val="lt1"/>
+          </a:fontRef>
+        </p:style>
+        <p:txBody>
+          <a:bodyPr rtlCol="0" anchor="ctr"/>
+          <a:lstStyle/>
+          <a:p>
+            <a:pPr algn="ctr"/>
+            <a:endParaRPr lang="hr-HR"/>
+          </a:p>
+        </p:txBody>
+      </p:sp>
     </p:spTree>
     <p:extLst>
       <p:ext uri="{BB962C8B-B14F-4D97-AF65-F5344CB8AC3E}">
         <p14:creationId xmlns:p14="http://schemas.microsoft.com/office/powerpoint/2010/main" val="273109006"/>
+      </p:ext>
+    </p:extLst>
+  </p:cSld>
+  <p:clrMapOvr>
+    <a:masterClrMapping/>
+  </p:clrMapOvr>
+  <p:timing>
+    <p:tnLst>
+      <p:par>
+        <p:cTn id="1" dur="indefinite" restart="never" nodeType="tmRoot"/>
+      </p:par>
+    </p:tnLst>
+  </p:timing>
+</p:sld>
+</file>
+
+<file path=ppt/slides/slide3.xml><?xml version="1.0" encoding="utf-8"?>
+<p:sld xmlns:a="http://schemas.openxmlformats.org/drawingml/2006/main" xmlns:r="http://schemas.openxmlformats.org/officeDocument/2006/relationships" xmlns:p="http://schemas.openxmlformats.org/presentationml/2006/main">
+  <p:cSld>
+    <p:spTree>
+      <p:nvGrpSpPr>
+        <p:cNvPr id="1" name=""/>
+        <p:cNvGrpSpPr/>
+        <p:nvPr/>
+      </p:nvGrpSpPr>
+      <p:grpSpPr>
+        <a:xfrm>
+          <a:off x="0" y="0"/>
+          <a:ext cx="0" cy="0"/>
+          <a:chOff x="0" y="0"/>
+          <a:chExt cx="0" cy="0"/>
+        </a:xfrm>
+      </p:grpSpPr>
+      <p:sp>
+        <p:nvSpPr>
+          <p:cNvPr id="4" name="TekstniOkvir 3"/>
+          <p:cNvSpPr txBox="1"/>
+          <p:nvPr/>
+        </p:nvSpPr>
+        <p:spPr>
+          <a:xfrm>
+            <a:off x="5838041" y="1392217"/>
+            <a:ext cx="3265715" cy="954107"/>
+          </a:xfrm>
+          <a:prstGeom prst="rect">
+            <a:avLst/>
+          </a:prstGeom>
+          <a:noFill/>
+        </p:spPr>
+        <p:txBody>
+          <a:bodyPr wrap="square" rtlCol="0">
+            <a:spAutoFit/>
+          </a:bodyPr>
+          <a:lstStyle/>
+          <a:p>
+            <a:pPr algn="ctr"/>
+            <a:r>
+              <a:rPr lang="hr-HR" sz="2800" dirty="0" smtClean="0"/>
+              <a:t>Zvijezda</a:t>
+            </a:r>
+          </a:p>
+          <a:p>
+            <a:r>
+              <a:rPr lang="hr-HR" sz="1400" dirty="0" smtClean="0"/>
+              <a:t>Ne znam što bi ovo trebalo radit, trebalo bi prodiskutirat.</a:t>
+            </a:r>
+            <a:endParaRPr lang="hr-HR" sz="1400" dirty="0"/>
+          </a:p>
+        </p:txBody>
+      </p:sp>
+      <p:sp>
+        <p:nvSpPr>
+          <p:cNvPr id="5" name="Zaobljeni pravokutnik 4"/>
+          <p:cNvSpPr/>
+          <p:nvPr/>
+        </p:nvSpPr>
+        <p:spPr>
+          <a:xfrm>
+            <a:off x="611713" y="316540"/>
+            <a:ext cx="3425125" cy="6168326"/>
+          </a:xfrm>
+          <a:prstGeom prst="roundRect">
+            <a:avLst/>
+          </a:prstGeom>
+          <a:noFill/>
+        </p:spPr>
+        <p:style>
+          <a:lnRef idx="2">
+            <a:schemeClr val="accent1">
+              <a:shade val="50000"/>
+            </a:schemeClr>
+          </a:lnRef>
+          <a:fillRef idx="1">
+            <a:schemeClr val="accent1"/>
+          </a:fillRef>
+          <a:effectRef idx="0">
+            <a:schemeClr val="accent1"/>
+          </a:effectRef>
+          <a:fontRef idx="minor">
+            <a:schemeClr val="lt1"/>
+          </a:fontRef>
+        </p:style>
+        <p:txBody>
+          <a:bodyPr rtlCol="0" anchor="ctr"/>
+          <a:lstStyle/>
+          <a:p>
+            <a:pPr algn="ctr"/>
+            <a:endParaRPr lang="hr-HR"/>
+          </a:p>
+        </p:txBody>
+      </p:sp>
+      <p:sp>
+        <p:nvSpPr>
+          <p:cNvPr id="6" name="Akcijski gumb: Povratak 5">
+            <a:hlinkClick r:id="" action="ppaction://hlinkshowjump?jump=firstslide" highlightClick="1"/>
+          </p:cNvPr>
+          <p:cNvSpPr/>
+          <p:nvPr/>
+        </p:nvSpPr>
+        <p:spPr>
+          <a:xfrm>
+            <a:off x="9906000" y="328902"/>
+            <a:ext cx="1620982" cy="1129572"/>
+          </a:xfrm>
+          <a:prstGeom prst="actionButtonReturn">
+            <a:avLst/>
+          </a:prstGeom>
+        </p:spPr>
+        <p:style>
+          <a:lnRef idx="2">
+            <a:schemeClr val="accent1">
+              <a:shade val="50000"/>
+            </a:schemeClr>
+          </a:lnRef>
+          <a:fillRef idx="1">
+            <a:schemeClr val="accent1"/>
+          </a:fillRef>
+          <a:effectRef idx="0">
+            <a:schemeClr val="accent1"/>
+          </a:effectRef>
+          <a:fontRef idx="minor">
+            <a:schemeClr val="lt1"/>
+          </a:fontRef>
+        </p:style>
+        <p:txBody>
+          <a:bodyPr rtlCol="0" anchor="ctr"/>
+          <a:lstStyle/>
+          <a:p>
+            <a:pPr algn="ctr"/>
+            <a:endParaRPr lang="hr-HR"/>
+          </a:p>
+        </p:txBody>
+      </p:sp>
+    </p:spTree>
+    <p:extLst>
+      <p:ext uri="{BB962C8B-B14F-4D97-AF65-F5344CB8AC3E}">
+        <p14:creationId xmlns:p14="http://schemas.microsoft.com/office/powerpoint/2010/main" val="2515259015"/>
+      </p:ext>
+    </p:extLst>
+  </p:cSld>
+  <p:clrMapOvr>
+    <a:masterClrMapping/>
+  </p:clrMapOvr>
+  <p:timing>
+    <p:tnLst>
+      <p:par>
+        <p:cTn id="1" dur="indefinite" restart="never" nodeType="tmRoot"/>
+      </p:par>
+    </p:tnLst>
+  </p:timing>
+</p:sld>
+</file>
+
+<file path=ppt/slides/slide4.xml><?xml version="1.0" encoding="utf-8"?>
+<p:sld xmlns:a="http://schemas.openxmlformats.org/drawingml/2006/main" xmlns:r="http://schemas.openxmlformats.org/officeDocument/2006/relationships" xmlns:p="http://schemas.openxmlformats.org/presentationml/2006/main">
+  <p:cSld>
+    <p:spTree>
+      <p:nvGrpSpPr>
+        <p:cNvPr id="1" name=""/>
+        <p:cNvGrpSpPr/>
+        <p:nvPr/>
+      </p:nvGrpSpPr>
+      <p:grpSpPr>
+        <a:xfrm>
+          <a:off x="0" y="0"/>
+          <a:ext cx="0" cy="0"/>
+          <a:chOff x="0" y="0"/>
+          <a:chExt cx="0" cy="0"/>
+        </a:xfrm>
+      </p:grpSpPr>
+      <p:sp>
+        <p:nvSpPr>
+          <p:cNvPr id="4" name="Zaobljeni pravokutnik 3"/>
+          <p:cNvSpPr/>
+          <p:nvPr/>
+        </p:nvSpPr>
+        <p:spPr>
+          <a:xfrm>
+            <a:off x="611713" y="316540"/>
+            <a:ext cx="3425125" cy="6168326"/>
+          </a:xfrm>
+          <a:prstGeom prst="roundRect">
+            <a:avLst/>
+          </a:prstGeom>
+          <a:noFill/>
+        </p:spPr>
+        <p:style>
+          <a:lnRef idx="2">
+            <a:schemeClr val="accent1">
+              <a:shade val="50000"/>
+            </a:schemeClr>
+          </a:lnRef>
+          <a:fillRef idx="1">
+            <a:schemeClr val="accent1"/>
+          </a:fillRef>
+          <a:effectRef idx="0">
+            <a:schemeClr val="accent1"/>
+          </a:effectRef>
+          <a:fontRef idx="minor">
+            <a:schemeClr val="lt1"/>
+          </a:fontRef>
+        </p:style>
+        <p:txBody>
+          <a:bodyPr rtlCol="0" anchor="ctr"/>
+          <a:lstStyle/>
+          <a:p>
+            <a:pPr algn="ctr"/>
+            <a:endParaRPr lang="hr-HR"/>
+          </a:p>
+        </p:txBody>
+      </p:sp>
+      <p:sp>
+        <p:nvSpPr>
+          <p:cNvPr id="5" name="TekstniOkvir 4"/>
+          <p:cNvSpPr txBox="1"/>
+          <p:nvPr/>
+        </p:nvSpPr>
+        <p:spPr>
+          <a:xfrm>
+            <a:off x="5838041" y="1392217"/>
+            <a:ext cx="3265715" cy="1384995"/>
+          </a:xfrm>
+          <a:prstGeom prst="rect">
+            <a:avLst/>
+          </a:prstGeom>
+          <a:noFill/>
+        </p:spPr>
+        <p:txBody>
+          <a:bodyPr wrap="square" rtlCol="0">
+            <a:spAutoFit/>
+          </a:bodyPr>
+          <a:lstStyle/>
+          <a:p>
+            <a:pPr algn="ctr"/>
+            <a:r>
+              <a:rPr lang="hr-HR" sz="2800" dirty="0" smtClean="0"/>
+              <a:t>Planiraj putovanje</a:t>
+            </a:r>
+          </a:p>
+          <a:p>
+            <a:r>
+              <a:rPr lang="hr-HR" sz="1400" dirty="0" smtClean="0"/>
+              <a:t>Odabire se stanica od mjesta na kojem jesi, do mjesta na koje želiš ići. Pokaže ti </a:t>
+            </a:r>
+            <a:r>
+              <a:rPr lang="hr-HR" sz="1400" dirty="0" err="1" smtClean="0"/>
+              <a:t>buseve</a:t>
+            </a:r>
+            <a:r>
+              <a:rPr lang="hr-HR" sz="1400" dirty="0" smtClean="0"/>
+              <a:t> u koje moraš ući  i gdje će te dovesti.</a:t>
+            </a:r>
+            <a:endParaRPr lang="hr-HR" sz="1400" dirty="0"/>
+          </a:p>
+        </p:txBody>
+      </p:sp>
+      <p:sp>
+        <p:nvSpPr>
+          <p:cNvPr id="6" name="Akcijski gumb: Povratak 5">
+            <a:hlinkClick r:id="" action="ppaction://hlinkshowjump?jump=firstslide" highlightClick="1"/>
+          </p:cNvPr>
+          <p:cNvSpPr/>
+          <p:nvPr/>
+        </p:nvSpPr>
+        <p:spPr>
+          <a:xfrm>
+            <a:off x="9906000" y="328902"/>
+            <a:ext cx="1620982" cy="1129572"/>
+          </a:xfrm>
+          <a:prstGeom prst="actionButtonReturn">
+            <a:avLst/>
+          </a:prstGeom>
+        </p:spPr>
+        <p:style>
+          <a:lnRef idx="2">
+            <a:schemeClr val="accent1">
+              <a:shade val="50000"/>
+            </a:schemeClr>
+          </a:lnRef>
+          <a:fillRef idx="1">
+            <a:schemeClr val="accent1"/>
+          </a:fillRef>
+          <a:effectRef idx="0">
+            <a:schemeClr val="accent1"/>
+          </a:effectRef>
+          <a:fontRef idx="minor">
+            <a:schemeClr val="lt1"/>
+          </a:fontRef>
+        </p:style>
+        <p:txBody>
+          <a:bodyPr rtlCol="0" anchor="ctr"/>
+          <a:lstStyle/>
+          <a:p>
+            <a:pPr algn="ctr"/>
+            <a:endParaRPr lang="hr-HR"/>
+          </a:p>
+        </p:txBody>
+      </p:sp>
+      <p:pic>
+        <p:nvPicPr>
+          <p:cNvPr id="7" name="Slika 6"/>
+          <p:cNvPicPr>
+            <a:picLocks noChangeAspect="1"/>
+          </p:cNvPicPr>
+          <p:nvPr/>
+        </p:nvPicPr>
+        <p:blipFill>
+          <a:blip r:embed="rId2"/>
+          <a:stretch>
+            <a:fillRect/>
+          </a:stretch>
+        </p:blipFill>
+        <p:spPr>
+          <a:xfrm>
+            <a:off x="781853" y="581058"/>
+            <a:ext cx="3084843" cy="5639289"/>
+          </a:xfrm>
+          <a:prstGeom prst="rect">
+            <a:avLst/>
+          </a:prstGeom>
+        </p:spPr>
+      </p:pic>
+    </p:spTree>
+    <p:extLst>
+      <p:ext uri="{BB962C8B-B14F-4D97-AF65-F5344CB8AC3E}">
+        <p14:creationId xmlns:p14="http://schemas.microsoft.com/office/powerpoint/2010/main" val="170643038"/>
+      </p:ext>
+    </p:extLst>
+  </p:cSld>
+  <p:clrMapOvr>
+    <a:masterClrMapping/>
+  </p:clrMapOvr>
+  <p:timing>
+    <p:tnLst>
+      <p:par>
+        <p:cTn id="1" dur="indefinite" restart="never" nodeType="tmRoot"/>
+      </p:par>
+    </p:tnLst>
+  </p:timing>
+</p:sld>
+</file>
+
+<file path=ppt/slides/slide5.xml><?xml version="1.0" encoding="utf-8"?>
+<p:sld xmlns:a="http://schemas.openxmlformats.org/drawingml/2006/main" xmlns:r="http://schemas.openxmlformats.org/officeDocument/2006/relationships" xmlns:p="http://schemas.openxmlformats.org/presentationml/2006/main">
+  <p:cSld>
+    <p:spTree>
+      <p:nvGrpSpPr>
+        <p:cNvPr id="1" name=""/>
+        <p:cNvGrpSpPr/>
+        <p:nvPr/>
+      </p:nvGrpSpPr>
+      <p:grpSpPr>
+        <a:xfrm>
+          <a:off x="0" y="0"/>
+          <a:ext cx="0" cy="0"/>
+          <a:chOff x="0" y="0"/>
+          <a:chExt cx="0" cy="0"/>
+        </a:xfrm>
+      </p:grpSpPr>
+      <p:sp>
+        <p:nvSpPr>
+          <p:cNvPr id="5" name="Zaobljeni pravokutnik 4"/>
+          <p:cNvSpPr/>
+          <p:nvPr/>
+        </p:nvSpPr>
+        <p:spPr>
+          <a:xfrm>
+            <a:off x="611713" y="316540"/>
+            <a:ext cx="3425125" cy="6168326"/>
+          </a:xfrm>
+          <a:prstGeom prst="roundRect">
+            <a:avLst/>
+          </a:prstGeom>
+          <a:noFill/>
+        </p:spPr>
+        <p:style>
+          <a:lnRef idx="2">
+            <a:schemeClr val="accent1">
+              <a:shade val="50000"/>
+            </a:schemeClr>
+          </a:lnRef>
+          <a:fillRef idx="1">
+            <a:schemeClr val="accent1"/>
+          </a:fillRef>
+          <a:effectRef idx="0">
+            <a:schemeClr val="accent1"/>
+          </a:effectRef>
+          <a:fontRef idx="minor">
+            <a:schemeClr val="lt1"/>
+          </a:fontRef>
+        </p:style>
+        <p:txBody>
+          <a:bodyPr rtlCol="0" anchor="ctr"/>
+          <a:lstStyle/>
+          <a:p>
+            <a:pPr algn="ctr"/>
+            <a:endParaRPr lang="hr-HR"/>
+          </a:p>
+        </p:txBody>
+      </p:sp>
+      <p:sp>
+        <p:nvSpPr>
+          <p:cNvPr id="6" name="TekstniOkvir 5"/>
+          <p:cNvSpPr txBox="1"/>
+          <p:nvPr/>
+        </p:nvSpPr>
+        <p:spPr>
+          <a:xfrm>
+            <a:off x="5838041" y="1392217"/>
+            <a:ext cx="3265715" cy="1384995"/>
+          </a:xfrm>
+          <a:prstGeom prst="rect">
+            <a:avLst/>
+          </a:prstGeom>
+          <a:noFill/>
+        </p:spPr>
+        <p:txBody>
+          <a:bodyPr wrap="square" rtlCol="0">
+            <a:spAutoFit/>
+          </a:bodyPr>
+          <a:lstStyle/>
+          <a:p>
+            <a:pPr algn="ctr"/>
+            <a:r>
+              <a:rPr lang="hr-HR" sz="2800" dirty="0" smtClean="0"/>
+              <a:t>Vozni red</a:t>
+            </a:r>
+          </a:p>
+          <a:p>
+            <a:r>
+              <a:rPr lang="hr-HR" sz="1400" dirty="0" smtClean="0"/>
+              <a:t>Vozni red. Uđeš  u određeni bus i trebalo bi ti pokazati koji trenutno voze,  i kad upreš na taj bus, trebalo bi ti pokazati gdje se taj određeni nalazi.</a:t>
+            </a:r>
+            <a:endParaRPr lang="hr-HR" sz="1400" dirty="0"/>
+          </a:p>
+        </p:txBody>
+      </p:sp>
+      <p:sp>
+        <p:nvSpPr>
+          <p:cNvPr id="7" name="Akcijski gumb: Povratak 6">
+            <a:hlinkClick r:id="" action="ppaction://hlinkshowjump?jump=firstslide" highlightClick="1"/>
+          </p:cNvPr>
+          <p:cNvSpPr/>
+          <p:nvPr/>
+        </p:nvSpPr>
+        <p:spPr>
+          <a:xfrm>
+            <a:off x="9906000" y="328902"/>
+            <a:ext cx="1620982" cy="1129572"/>
+          </a:xfrm>
+          <a:prstGeom prst="actionButtonReturn">
+            <a:avLst/>
+          </a:prstGeom>
+        </p:spPr>
+        <p:style>
+          <a:lnRef idx="2">
+            <a:schemeClr val="accent1">
+              <a:shade val="50000"/>
+            </a:schemeClr>
+          </a:lnRef>
+          <a:fillRef idx="1">
+            <a:schemeClr val="accent1"/>
+          </a:fillRef>
+          <a:effectRef idx="0">
+            <a:schemeClr val="accent1"/>
+          </a:effectRef>
+          <a:fontRef idx="minor">
+            <a:schemeClr val="lt1"/>
+          </a:fontRef>
+        </p:style>
+        <p:txBody>
+          <a:bodyPr rtlCol="0" anchor="ctr"/>
+          <a:lstStyle/>
+          <a:p>
+            <a:pPr algn="ctr"/>
+            <a:endParaRPr lang="hr-HR"/>
+          </a:p>
+        </p:txBody>
+      </p:sp>
+      <p:pic>
+        <p:nvPicPr>
+          <p:cNvPr id="8" name="Slika 7"/>
+          <p:cNvPicPr>
+            <a:picLocks noChangeAspect="1"/>
+          </p:cNvPicPr>
+          <p:nvPr/>
+        </p:nvPicPr>
+        <p:blipFill rotWithShape="1">
+          <a:blip r:embed="rId2" cstate="print">
+            <a:extLst>
+              <a:ext uri="{28A0092B-C50C-407E-A947-70E740481C1C}">
+                <a14:useLocalDpi xmlns:a14="http://schemas.microsoft.com/office/drawing/2010/main" val="0"/>
+              </a:ext>
+            </a:extLst>
+          </a:blip>
+          <a:srcRect b="13535"/>
+          <a:stretch/>
+        </p:blipFill>
+        <p:spPr>
+          <a:xfrm>
+            <a:off x="782229" y="512618"/>
+            <a:ext cx="3084091" cy="5746029"/>
+          </a:xfrm>
+          <a:prstGeom prst="rect">
+            <a:avLst/>
+          </a:prstGeom>
+        </p:spPr>
+      </p:pic>
+    </p:spTree>
+    <p:extLst>
+      <p:ext uri="{BB962C8B-B14F-4D97-AF65-F5344CB8AC3E}">
+        <p14:creationId xmlns:p14="http://schemas.microsoft.com/office/powerpoint/2010/main" val="3620945652"/>
+      </p:ext>
+    </p:extLst>
+  </p:cSld>
+  <p:clrMapOvr>
+    <a:masterClrMapping/>
+  </p:clrMapOvr>
+</p:sld>
+</file>
+
+<file path=ppt/slides/slide6.xml><?xml version="1.0" encoding="utf-8"?>
+<p:sld xmlns:a="http://schemas.openxmlformats.org/drawingml/2006/main" xmlns:r="http://schemas.openxmlformats.org/officeDocument/2006/relationships" xmlns:p="http://schemas.openxmlformats.org/presentationml/2006/main">
+  <p:cSld>
+    <p:spTree>
+      <p:nvGrpSpPr>
+        <p:cNvPr id="1" name=""/>
+        <p:cNvGrpSpPr/>
+        <p:nvPr/>
+      </p:nvGrpSpPr>
+      <p:grpSpPr>
+        <a:xfrm>
+          <a:off x="0" y="0"/>
+          <a:ext cx="0" cy="0"/>
+          <a:chOff x="0" y="0"/>
+          <a:chExt cx="0" cy="0"/>
+        </a:xfrm>
+      </p:grpSpPr>
+      <p:sp>
+        <p:nvSpPr>
+          <p:cNvPr id="4" name="Zaobljeni pravokutnik 3"/>
+          <p:cNvSpPr/>
+          <p:nvPr/>
+        </p:nvSpPr>
+        <p:spPr>
+          <a:xfrm>
+            <a:off x="611713" y="316540"/>
+            <a:ext cx="3425125" cy="6168326"/>
+          </a:xfrm>
+          <a:prstGeom prst="roundRect">
+            <a:avLst/>
+          </a:prstGeom>
+          <a:noFill/>
+        </p:spPr>
+        <p:style>
+          <a:lnRef idx="2">
+            <a:schemeClr val="accent1">
+              <a:shade val="50000"/>
+            </a:schemeClr>
+          </a:lnRef>
+          <a:fillRef idx="1">
+            <a:schemeClr val="accent1"/>
+          </a:fillRef>
+          <a:effectRef idx="0">
+            <a:schemeClr val="accent1"/>
+          </a:effectRef>
+          <a:fontRef idx="minor">
+            <a:schemeClr val="lt1"/>
+          </a:fontRef>
+        </p:style>
+        <p:txBody>
+          <a:bodyPr rtlCol="0" anchor="ctr"/>
+          <a:lstStyle/>
+          <a:p>
+            <a:pPr algn="ctr"/>
+            <a:endParaRPr lang="hr-HR"/>
+          </a:p>
+        </p:txBody>
+      </p:sp>
+      <p:sp>
+        <p:nvSpPr>
+          <p:cNvPr id="5" name="TekstniOkvir 4"/>
+          <p:cNvSpPr txBox="1"/>
+          <p:nvPr/>
+        </p:nvSpPr>
+        <p:spPr>
+          <a:xfrm>
+            <a:off x="8141524" y="1773721"/>
+            <a:ext cx="3265715" cy="954107"/>
+          </a:xfrm>
+          <a:prstGeom prst="rect">
+            <a:avLst/>
+          </a:prstGeom>
+          <a:noFill/>
+        </p:spPr>
+        <p:txBody>
+          <a:bodyPr wrap="square" rtlCol="0">
+            <a:spAutoFit/>
+          </a:bodyPr>
+          <a:lstStyle/>
+          <a:p>
+            <a:pPr algn="ctr"/>
+            <a:r>
+              <a:rPr lang="hr-HR" sz="2800" dirty="0" smtClean="0"/>
+              <a:t>Prodajna mjesta</a:t>
+            </a:r>
+          </a:p>
+          <a:p>
+            <a:r>
+              <a:rPr lang="hr-HR" sz="1400" dirty="0" smtClean="0"/>
+              <a:t>Mjesta na kojima se prodaju karte i radno </a:t>
+            </a:r>
+            <a:r>
+              <a:rPr lang="hr-HR" sz="1400" dirty="0" err="1" smtClean="0"/>
+              <a:t>vrime</a:t>
+            </a:r>
+            <a:r>
+              <a:rPr lang="hr-HR" sz="1400" dirty="0" smtClean="0"/>
+              <a:t>.</a:t>
+            </a:r>
+            <a:endParaRPr lang="hr-HR" sz="1400" dirty="0"/>
+          </a:p>
+        </p:txBody>
+      </p:sp>
+      <p:sp>
+        <p:nvSpPr>
+          <p:cNvPr id="6" name="Akcijski gumb: Povratak 5">
+            <a:hlinkClick r:id="" action="ppaction://hlinkshowjump?jump=firstslide" highlightClick="1"/>
+          </p:cNvPr>
+          <p:cNvSpPr/>
+          <p:nvPr/>
+        </p:nvSpPr>
+        <p:spPr>
+          <a:xfrm>
+            <a:off x="9906000" y="328902"/>
+            <a:ext cx="1620982" cy="1129572"/>
+          </a:xfrm>
+          <a:prstGeom prst="actionButtonReturn">
+            <a:avLst/>
+          </a:prstGeom>
+        </p:spPr>
+        <p:style>
+          <a:lnRef idx="2">
+            <a:schemeClr val="accent1">
+              <a:shade val="50000"/>
+            </a:schemeClr>
+          </a:lnRef>
+          <a:fillRef idx="1">
+            <a:schemeClr val="accent1"/>
+          </a:fillRef>
+          <a:effectRef idx="0">
+            <a:schemeClr val="accent1"/>
+          </a:effectRef>
+          <a:fontRef idx="minor">
+            <a:schemeClr val="lt1"/>
+          </a:fontRef>
+        </p:style>
+        <p:txBody>
+          <a:bodyPr rtlCol="0" anchor="ctr"/>
+          <a:lstStyle/>
+          <a:p>
+            <a:pPr algn="ctr"/>
+            <a:endParaRPr lang="hr-HR"/>
+          </a:p>
+        </p:txBody>
+      </p:sp>
+      <p:pic>
+        <p:nvPicPr>
+          <p:cNvPr id="7" name="Slika 6"/>
+          <p:cNvPicPr>
+            <a:picLocks noChangeAspect="1"/>
+          </p:cNvPicPr>
+          <p:nvPr/>
+        </p:nvPicPr>
+        <p:blipFill>
+          <a:blip r:embed="rId2" cstate="print">
+            <a:extLst>
+              <a:ext uri="{28A0092B-C50C-407E-A947-70E740481C1C}">
+                <a14:useLocalDpi xmlns:a14="http://schemas.microsoft.com/office/drawing/2010/main" val="0"/>
+              </a:ext>
+            </a:extLst>
+          </a:blip>
+          <a:stretch>
+            <a:fillRect/>
+          </a:stretch>
+        </p:blipFill>
+        <p:spPr>
+          <a:xfrm>
+            <a:off x="886691" y="487479"/>
+            <a:ext cx="2854036" cy="5826448"/>
+          </a:xfrm>
+          <a:prstGeom prst="rect">
+            <a:avLst/>
+          </a:prstGeom>
+        </p:spPr>
+      </p:pic>
+      <p:sp>
+        <p:nvSpPr>
+          <p:cNvPr id="8" name="Zaobljeni pravokutnik 7"/>
+          <p:cNvSpPr/>
+          <p:nvPr/>
+        </p:nvSpPr>
+        <p:spPr>
+          <a:xfrm>
+            <a:off x="4200040" y="316539"/>
+            <a:ext cx="3425125" cy="6168326"/>
+          </a:xfrm>
+          <a:prstGeom prst="roundRect">
+            <a:avLst/>
+          </a:prstGeom>
+          <a:noFill/>
+        </p:spPr>
+        <p:style>
+          <a:lnRef idx="2">
+            <a:schemeClr val="accent1">
+              <a:shade val="50000"/>
+            </a:schemeClr>
+          </a:lnRef>
+          <a:fillRef idx="1">
+            <a:schemeClr val="accent1"/>
+          </a:fillRef>
+          <a:effectRef idx="0">
+            <a:schemeClr val="accent1"/>
+          </a:effectRef>
+          <a:fontRef idx="minor">
+            <a:schemeClr val="lt1"/>
+          </a:fontRef>
+        </p:style>
+        <p:txBody>
+          <a:bodyPr rtlCol="0" anchor="ctr"/>
+          <a:lstStyle/>
+          <a:p>
+            <a:pPr algn="ctr"/>
+            <a:endParaRPr lang="hr-HR"/>
+          </a:p>
+        </p:txBody>
+      </p:sp>
+      <p:pic>
+        <p:nvPicPr>
+          <p:cNvPr id="9" name="Slika 8"/>
+          <p:cNvPicPr>
+            <a:picLocks noChangeAspect="1"/>
+          </p:cNvPicPr>
+          <p:nvPr/>
+        </p:nvPicPr>
+        <p:blipFill>
+          <a:blip r:embed="rId3" cstate="print">
+            <a:extLst>
+              <a:ext uri="{28A0092B-C50C-407E-A947-70E740481C1C}">
+                <a14:useLocalDpi xmlns:a14="http://schemas.microsoft.com/office/drawing/2010/main" val="0"/>
+              </a:ext>
+            </a:extLst>
+          </a:blip>
+          <a:stretch>
+            <a:fillRect/>
+          </a:stretch>
+        </p:blipFill>
+        <p:spPr>
+          <a:xfrm>
+            <a:off x="4444020" y="487479"/>
+            <a:ext cx="2937163" cy="5826448"/>
+          </a:xfrm>
+          <a:prstGeom prst="rect">
+            <a:avLst/>
+          </a:prstGeom>
+        </p:spPr>
+      </p:pic>
+    </p:spTree>
+    <p:extLst>
+      <p:ext uri="{BB962C8B-B14F-4D97-AF65-F5344CB8AC3E}">
+        <p14:creationId xmlns:p14="http://schemas.microsoft.com/office/powerpoint/2010/main" val="199131270"/>
+      </p:ext>
+    </p:extLst>
+  </p:cSld>
+  <p:clrMapOvr>
+    <a:masterClrMapping/>
+  </p:clrMapOvr>
+</p:sld>
+</file>
+
+<file path=ppt/slides/slide7.xml><?xml version="1.0" encoding="utf-8"?>
+<p:sld xmlns:a="http://schemas.openxmlformats.org/drawingml/2006/main" xmlns:r="http://schemas.openxmlformats.org/officeDocument/2006/relationships" xmlns:p="http://schemas.openxmlformats.org/presentationml/2006/main">
+  <p:cSld>
+    <p:spTree>
+      <p:nvGrpSpPr>
+        <p:cNvPr id="1" name=""/>
+        <p:cNvGrpSpPr/>
+        <p:nvPr/>
+      </p:nvGrpSpPr>
+      <p:grpSpPr>
+        <a:xfrm>
+          <a:off x="0" y="0"/>
+          <a:ext cx="0" cy="0"/>
+          <a:chOff x="0" y="0"/>
+          <a:chExt cx="0" cy="0"/>
+        </a:xfrm>
+      </p:grpSpPr>
+      <p:sp>
+        <p:nvSpPr>
+          <p:cNvPr id="4" name="Zaobljeni pravokutnik 3"/>
+          <p:cNvSpPr/>
+          <p:nvPr/>
+        </p:nvSpPr>
+        <p:spPr>
+          <a:xfrm>
+            <a:off x="611713" y="316540"/>
+            <a:ext cx="3425125" cy="6168326"/>
+          </a:xfrm>
+          <a:prstGeom prst="roundRect">
+            <a:avLst/>
+          </a:prstGeom>
+          <a:noFill/>
+        </p:spPr>
+        <p:style>
+          <a:lnRef idx="2">
+            <a:schemeClr val="accent1">
+              <a:shade val="50000"/>
+            </a:schemeClr>
+          </a:lnRef>
+          <a:fillRef idx="1">
+            <a:schemeClr val="accent1"/>
+          </a:fillRef>
+          <a:effectRef idx="0">
+            <a:schemeClr val="accent1"/>
+          </a:effectRef>
+          <a:fontRef idx="minor">
+            <a:schemeClr val="lt1"/>
+          </a:fontRef>
+        </p:style>
+        <p:txBody>
+          <a:bodyPr rtlCol="0" anchor="ctr"/>
+          <a:lstStyle/>
+          <a:p>
+            <a:pPr algn="ctr"/>
+            <a:endParaRPr lang="hr-HR"/>
+          </a:p>
+        </p:txBody>
+      </p:sp>
+      <p:sp>
+        <p:nvSpPr>
+          <p:cNvPr id="5" name="TekstniOkvir 4"/>
+          <p:cNvSpPr txBox="1"/>
+          <p:nvPr/>
+        </p:nvSpPr>
+        <p:spPr>
+          <a:xfrm>
+            <a:off x="5838041" y="1392217"/>
+            <a:ext cx="3265715" cy="954107"/>
+          </a:xfrm>
+          <a:prstGeom prst="rect">
+            <a:avLst/>
+          </a:prstGeom>
+          <a:noFill/>
+        </p:spPr>
+        <p:txBody>
+          <a:bodyPr wrap="square" rtlCol="0">
+            <a:spAutoFit/>
+          </a:bodyPr>
+          <a:lstStyle/>
+          <a:p>
+            <a:pPr algn="ctr"/>
+            <a:r>
+              <a:rPr lang="hr-HR" sz="2800" dirty="0" smtClean="0"/>
+              <a:t>E - novčanik</a:t>
+            </a:r>
+          </a:p>
+          <a:p>
+            <a:r>
+              <a:rPr lang="hr-HR" sz="1400" dirty="0" smtClean="0"/>
+              <a:t>Ovo moramo prodiskutirat jer ovo želimo konkretno popravit.</a:t>
+            </a:r>
+            <a:endParaRPr lang="hr-HR" sz="1400" dirty="0"/>
+          </a:p>
+        </p:txBody>
+      </p:sp>
+      <p:sp>
+        <p:nvSpPr>
+          <p:cNvPr id="6" name="Akcijski gumb: Povratak 5">
+            <a:hlinkClick r:id="" action="ppaction://hlinkshowjump?jump=firstslide" highlightClick="1"/>
+          </p:cNvPr>
+          <p:cNvSpPr/>
+          <p:nvPr/>
+        </p:nvSpPr>
+        <p:spPr>
+          <a:xfrm>
+            <a:off x="9906000" y="328902"/>
+            <a:ext cx="1620982" cy="1129572"/>
+          </a:xfrm>
+          <a:prstGeom prst="actionButtonReturn">
+            <a:avLst/>
+          </a:prstGeom>
+        </p:spPr>
+        <p:style>
+          <a:lnRef idx="2">
+            <a:schemeClr val="accent1">
+              <a:shade val="50000"/>
+            </a:schemeClr>
+          </a:lnRef>
+          <a:fillRef idx="1">
+            <a:schemeClr val="accent1"/>
+          </a:fillRef>
+          <a:effectRef idx="0">
+            <a:schemeClr val="accent1"/>
+          </a:effectRef>
+          <a:fontRef idx="minor">
+            <a:schemeClr val="lt1"/>
+          </a:fontRef>
+        </p:style>
+        <p:txBody>
+          <a:bodyPr rtlCol="0" anchor="ctr"/>
+          <a:lstStyle/>
+          <a:p>
+            <a:pPr algn="ctr"/>
+            <a:endParaRPr lang="hr-HR"/>
+          </a:p>
+        </p:txBody>
+      </p:sp>
+    </p:spTree>
+    <p:extLst>
+      <p:ext uri="{BB962C8B-B14F-4D97-AF65-F5344CB8AC3E}">
+        <p14:creationId xmlns:p14="http://schemas.microsoft.com/office/powerpoint/2010/main" val="1394106895"/>
+      </p:ext>
+    </p:extLst>
+  </p:cSld>
+  <p:clrMapOvr>
+    <a:masterClrMapping/>
+  </p:clrMapOvr>
+</p:sld>
+</file>
+
+<file path=ppt/slides/slide8.xml><?xml version="1.0" encoding="utf-8"?>
+<p:sld xmlns:a="http://schemas.openxmlformats.org/drawingml/2006/main" xmlns:r="http://schemas.openxmlformats.org/officeDocument/2006/relationships" xmlns:p="http://schemas.openxmlformats.org/presentationml/2006/main">
+  <p:cSld>
+    <p:spTree>
+      <p:nvGrpSpPr>
+        <p:cNvPr id="1" name=""/>
+        <p:cNvGrpSpPr/>
+        <p:nvPr/>
+      </p:nvGrpSpPr>
+      <p:grpSpPr>
+        <a:xfrm>
+          <a:off x="0" y="0"/>
+          <a:ext cx="0" cy="0"/>
+          <a:chOff x="0" y="0"/>
+          <a:chExt cx="0" cy="0"/>
+        </a:xfrm>
+      </p:grpSpPr>
+      <p:sp>
+        <p:nvSpPr>
+          <p:cNvPr id="4" name="Zaobljeni pravokutnik 3"/>
+          <p:cNvSpPr/>
+          <p:nvPr/>
+        </p:nvSpPr>
+        <p:spPr>
+          <a:xfrm>
+            <a:off x="611713" y="316540"/>
+            <a:ext cx="3425125" cy="6168326"/>
+          </a:xfrm>
+          <a:prstGeom prst="roundRect">
+            <a:avLst/>
+          </a:prstGeom>
+          <a:noFill/>
+        </p:spPr>
+        <p:style>
+          <a:lnRef idx="2">
+            <a:schemeClr val="accent1">
+              <a:shade val="50000"/>
+            </a:schemeClr>
+          </a:lnRef>
+          <a:fillRef idx="1">
+            <a:schemeClr val="accent1"/>
+          </a:fillRef>
+          <a:effectRef idx="0">
+            <a:schemeClr val="accent1"/>
+          </a:effectRef>
+          <a:fontRef idx="minor">
+            <a:schemeClr val="lt1"/>
+          </a:fontRef>
+        </p:style>
+        <p:txBody>
+          <a:bodyPr rtlCol="0" anchor="ctr"/>
+          <a:lstStyle/>
+          <a:p>
+            <a:pPr algn="ctr"/>
+            <a:endParaRPr lang="hr-HR"/>
+          </a:p>
+        </p:txBody>
+      </p:sp>
+      <p:sp>
+        <p:nvSpPr>
+          <p:cNvPr id="5" name="TekstniOkvir 4"/>
+          <p:cNvSpPr txBox="1"/>
+          <p:nvPr/>
+        </p:nvSpPr>
+        <p:spPr>
+          <a:xfrm>
+            <a:off x="5838041" y="1392217"/>
+            <a:ext cx="3265715" cy="954107"/>
+          </a:xfrm>
+          <a:prstGeom prst="rect">
+            <a:avLst/>
+          </a:prstGeom>
+          <a:noFill/>
+        </p:spPr>
+        <p:txBody>
+          <a:bodyPr wrap="square" rtlCol="0">
+            <a:spAutoFit/>
+          </a:bodyPr>
+          <a:lstStyle/>
+          <a:p>
+            <a:pPr algn="ctr"/>
+            <a:r>
+              <a:rPr lang="hr-HR" sz="2800" dirty="0" smtClean="0"/>
+              <a:t>Moje karte</a:t>
+            </a:r>
+          </a:p>
+          <a:p>
+            <a:r>
+              <a:rPr lang="hr-HR" sz="1400" dirty="0" smtClean="0"/>
+              <a:t>Koliko kužim ovdje su kupljene karte i iskorištene karte (</a:t>
+            </a:r>
+            <a:r>
+              <a:rPr lang="hr-HR" sz="1400" dirty="0" err="1" smtClean="0"/>
+              <a:t>basically</a:t>
+            </a:r>
+            <a:r>
+              <a:rPr lang="hr-HR" sz="1400" dirty="0" smtClean="0"/>
+              <a:t> ‘računi’ karata)</a:t>
+            </a:r>
+            <a:endParaRPr lang="hr-HR" sz="1400" dirty="0"/>
+          </a:p>
+        </p:txBody>
+      </p:sp>
+      <p:sp>
+        <p:nvSpPr>
+          <p:cNvPr id="6" name="Akcijski gumb: Povratak 5">
+            <a:hlinkClick r:id="" action="ppaction://hlinkshowjump?jump=firstslide" highlightClick="1"/>
+          </p:cNvPr>
+          <p:cNvSpPr/>
+          <p:nvPr/>
+        </p:nvSpPr>
+        <p:spPr>
+          <a:xfrm>
+            <a:off x="9906000" y="328902"/>
+            <a:ext cx="1620982" cy="1129572"/>
+          </a:xfrm>
+          <a:prstGeom prst="actionButtonReturn">
+            <a:avLst/>
+          </a:prstGeom>
+        </p:spPr>
+        <p:style>
+          <a:lnRef idx="2">
+            <a:schemeClr val="accent1">
+              <a:shade val="50000"/>
+            </a:schemeClr>
+          </a:lnRef>
+          <a:fillRef idx="1">
+            <a:schemeClr val="accent1"/>
+          </a:fillRef>
+          <a:effectRef idx="0">
+            <a:schemeClr val="accent1"/>
+          </a:effectRef>
+          <a:fontRef idx="minor">
+            <a:schemeClr val="lt1"/>
+          </a:fontRef>
+        </p:style>
+        <p:txBody>
+          <a:bodyPr rtlCol="0" anchor="ctr"/>
+          <a:lstStyle/>
+          <a:p>
+            <a:pPr algn="ctr"/>
+            <a:endParaRPr lang="hr-HR"/>
+          </a:p>
+        </p:txBody>
+      </p:sp>
+      <p:pic>
+        <p:nvPicPr>
+          <p:cNvPr id="7" name="Slika 6"/>
+          <p:cNvPicPr>
+            <a:picLocks noChangeAspect="1"/>
+          </p:cNvPicPr>
+          <p:nvPr/>
+        </p:nvPicPr>
+        <p:blipFill>
+          <a:blip r:embed="rId2" cstate="print">
+            <a:extLst>
+              <a:ext uri="{28A0092B-C50C-407E-A947-70E740481C1C}">
+                <a14:useLocalDpi xmlns:a14="http://schemas.microsoft.com/office/drawing/2010/main" val="0"/>
+              </a:ext>
+            </a:extLst>
+          </a:blip>
+          <a:stretch>
+            <a:fillRect/>
+          </a:stretch>
+        </p:blipFill>
+        <p:spPr>
+          <a:xfrm>
+            <a:off x="956604" y="406328"/>
+            <a:ext cx="2784124" cy="5952908"/>
+          </a:xfrm>
+          <a:prstGeom prst="rect">
+            <a:avLst/>
+          </a:prstGeom>
+        </p:spPr>
+      </p:pic>
+    </p:spTree>
+    <p:extLst>
+      <p:ext uri="{BB962C8B-B14F-4D97-AF65-F5344CB8AC3E}">
+        <p14:creationId xmlns:p14="http://schemas.microsoft.com/office/powerpoint/2010/main" val="3656128881"/>
+      </p:ext>
+    </p:extLst>
+  </p:cSld>
+  <p:clrMapOvr>
+    <a:masterClrMapping/>
+  </p:clrMapOvr>
+</p:sld>
+</file>
+
+<file path=ppt/slides/slide9.xml><?xml version="1.0" encoding="utf-8"?>
+<p:sld xmlns:a="http://schemas.openxmlformats.org/drawingml/2006/main" xmlns:r="http://schemas.openxmlformats.org/officeDocument/2006/relationships" xmlns:p="http://schemas.openxmlformats.org/presentationml/2006/main">
+  <p:cSld>
+    <p:spTree>
+      <p:nvGrpSpPr>
+        <p:cNvPr id="1" name=""/>
+        <p:cNvGrpSpPr/>
+        <p:nvPr/>
+      </p:nvGrpSpPr>
+      <p:grpSpPr>
+        <a:xfrm>
+          <a:off x="0" y="0"/>
+          <a:ext cx="0" cy="0"/>
+          <a:chOff x="0" y="0"/>
+          <a:chExt cx="0" cy="0"/>
+        </a:xfrm>
+      </p:grpSpPr>
+      <p:sp>
+        <p:nvSpPr>
+          <p:cNvPr id="4" name="Zaobljeni pravokutnik 3"/>
+          <p:cNvSpPr/>
+          <p:nvPr/>
+        </p:nvSpPr>
+        <p:spPr>
+          <a:xfrm>
+            <a:off x="611713" y="316540"/>
+            <a:ext cx="3425125" cy="6168326"/>
+          </a:xfrm>
+          <a:prstGeom prst="roundRect">
+            <a:avLst/>
+          </a:prstGeom>
+          <a:noFill/>
+        </p:spPr>
+        <p:style>
+          <a:lnRef idx="2">
+            <a:schemeClr val="accent1">
+              <a:shade val="50000"/>
+            </a:schemeClr>
+          </a:lnRef>
+          <a:fillRef idx="1">
+            <a:schemeClr val="accent1"/>
+          </a:fillRef>
+          <a:effectRef idx="0">
+            <a:schemeClr val="accent1"/>
+          </a:effectRef>
+          <a:fontRef idx="minor">
+            <a:schemeClr val="lt1"/>
+          </a:fontRef>
+        </p:style>
+        <p:txBody>
+          <a:bodyPr rtlCol="0" anchor="ctr"/>
+          <a:lstStyle/>
+          <a:p>
+            <a:pPr algn="ctr"/>
+            <a:endParaRPr lang="hr-HR"/>
+          </a:p>
+        </p:txBody>
+      </p:sp>
+      <p:sp>
+        <p:nvSpPr>
+          <p:cNvPr id="5" name="TekstniOkvir 4"/>
+          <p:cNvSpPr txBox="1"/>
+          <p:nvPr/>
+        </p:nvSpPr>
+        <p:spPr>
+          <a:xfrm>
+            <a:off x="5838041" y="1392217"/>
+            <a:ext cx="3265715" cy="738664"/>
+          </a:xfrm>
+          <a:prstGeom prst="rect">
+            <a:avLst/>
+          </a:prstGeom>
+          <a:noFill/>
+        </p:spPr>
+        <p:txBody>
+          <a:bodyPr wrap="square" rtlCol="0">
+            <a:spAutoFit/>
+          </a:bodyPr>
+          <a:lstStyle/>
+          <a:p>
+            <a:pPr algn="ctr"/>
+            <a:r>
+              <a:rPr lang="hr-HR" sz="2800" dirty="0" smtClean="0"/>
+              <a:t>Kupi kartu</a:t>
+            </a:r>
+            <a:endParaRPr lang="hr-HR" sz="2800" dirty="0" smtClean="0"/>
+          </a:p>
+          <a:p>
+            <a:r>
+              <a:rPr lang="hr-HR" sz="1400" dirty="0" smtClean="0"/>
+              <a:t>Valjda kupovanje karte za određenu zonu.</a:t>
+            </a:r>
+            <a:endParaRPr lang="hr-HR" sz="1400" dirty="0"/>
+          </a:p>
+        </p:txBody>
+      </p:sp>
+      <p:sp>
+        <p:nvSpPr>
+          <p:cNvPr id="6" name="Akcijski gumb: Povratak 5">
+            <a:hlinkClick r:id="" action="ppaction://hlinkshowjump?jump=firstslide" highlightClick="1"/>
+          </p:cNvPr>
+          <p:cNvSpPr/>
+          <p:nvPr/>
+        </p:nvSpPr>
+        <p:spPr>
+          <a:xfrm>
+            <a:off x="9906000" y="328902"/>
+            <a:ext cx="1620982" cy="1129572"/>
+          </a:xfrm>
+          <a:prstGeom prst="actionButtonReturn">
+            <a:avLst/>
+          </a:prstGeom>
+        </p:spPr>
+        <p:style>
+          <a:lnRef idx="2">
+            <a:schemeClr val="accent1">
+              <a:shade val="50000"/>
+            </a:schemeClr>
+          </a:lnRef>
+          <a:fillRef idx="1">
+            <a:schemeClr val="accent1"/>
+          </a:fillRef>
+          <a:effectRef idx="0">
+            <a:schemeClr val="accent1"/>
+          </a:effectRef>
+          <a:fontRef idx="minor">
+            <a:schemeClr val="lt1"/>
+          </a:fontRef>
+        </p:style>
+        <p:txBody>
+          <a:bodyPr rtlCol="0" anchor="ctr"/>
+          <a:lstStyle/>
+          <a:p>
+            <a:pPr algn="ctr"/>
+            <a:endParaRPr lang="hr-HR"/>
+          </a:p>
+        </p:txBody>
+      </p:sp>
+      <p:pic>
+        <p:nvPicPr>
+          <p:cNvPr id="7" name="Slika 6"/>
+          <p:cNvPicPr>
+            <a:picLocks noChangeAspect="1"/>
+          </p:cNvPicPr>
+          <p:nvPr/>
+        </p:nvPicPr>
+        <p:blipFill>
+          <a:blip r:embed="rId2" cstate="print">
+            <a:extLst>
+              <a:ext uri="{28A0092B-C50C-407E-A947-70E740481C1C}">
+                <a14:useLocalDpi xmlns:a14="http://schemas.microsoft.com/office/drawing/2010/main" val="0"/>
+              </a:ext>
+            </a:extLst>
+          </a:blip>
+          <a:stretch>
+            <a:fillRect/>
+          </a:stretch>
+        </p:blipFill>
+        <p:spPr>
+          <a:xfrm>
+            <a:off x="982787" y="419620"/>
+            <a:ext cx="2682975" cy="5962166"/>
+          </a:xfrm>
+          <a:prstGeom prst="rect">
+            <a:avLst/>
+          </a:prstGeom>
+        </p:spPr>
+      </p:pic>
+    </p:spTree>
+    <p:extLst>
+      <p:ext uri="{BB962C8B-B14F-4D97-AF65-F5344CB8AC3E}">
+        <p14:creationId xmlns:p14="http://schemas.microsoft.com/office/powerpoint/2010/main" val="7170256"/>
       </p:ext>
     </p:extLst>
   </p:cSld>

</xml_diff>